<commit_message>
within group beta-diversity testing. homogenization of within group dissimlairity in chemical herb treated plots.
</commit_message>
<xml_diff>
--- a/Figures/Combined Plots/Combined_FiguresPPT.pptx
+++ b/Figures/Combined Plots/Combined_FiguresPPT.pptx
@@ -4,6 +4,9 @@
   <p:sldMasterIdLst>
     <p:sldMasterId id="2147483648" r:id="rId1"/>
   </p:sldMasterIdLst>
+  <p:notesMasterIdLst>
+    <p:notesMasterId r:id="rId3"/>
+  </p:notesMasterIdLst>
   <p:sldIdLst>
     <p:sldId id="256" r:id="rId2"/>
   </p:sldIdLst>
@@ -104,7 +107,445 @@
       </a:defRPr>
     </a:lvl9pPr>
   </p:defaultTextStyle>
+  <p:extLst>
+    <p:ext uri="{EFAFB233-063F-42B5-8137-9DF3F51BA10A}">
+      <p15:sldGuideLst xmlns:p15="http://schemas.microsoft.com/office/powerpoint/2012/main"/>
+    </p:ext>
+  </p:extLst>
 </p:presentation>
+</file>
+
+<file path=ppt/notesMasters/notesMaster1.xml><?xml version="1.0" encoding="utf-8"?>
+<p:notesMaster xmlns:a="http://schemas.openxmlformats.org/drawingml/2006/main" xmlns:r="http://schemas.openxmlformats.org/officeDocument/2006/relationships" xmlns:p="http://schemas.openxmlformats.org/presentationml/2006/main">
+  <p:cSld>
+    <p:bg>
+      <p:bgRef idx="1001">
+        <a:schemeClr val="bg1"/>
+      </p:bgRef>
+    </p:bg>
+    <p:spTree>
+      <p:nvGrpSpPr>
+        <p:cNvPr id="1" name=""/>
+        <p:cNvGrpSpPr/>
+        <p:nvPr/>
+      </p:nvGrpSpPr>
+      <p:grpSpPr>
+        <a:xfrm>
+          <a:off x="0" y="0"/>
+          <a:ext cx="0" cy="0"/>
+          <a:chOff x="0" y="0"/>
+          <a:chExt cx="0" cy="0"/>
+        </a:xfrm>
+      </p:grpSpPr>
+      <p:sp>
+        <p:nvSpPr>
+          <p:cNvPr id="2" name="Header Placeholder 1"/>
+          <p:cNvSpPr>
+            <a:spLocks noGrp="1"/>
+          </p:cNvSpPr>
+          <p:nvPr>
+            <p:ph type="hdr" sz="quarter"/>
+          </p:nvPr>
+        </p:nvSpPr>
+        <p:spPr>
+          <a:xfrm>
+            <a:off x="0" y="0"/>
+            <a:ext cx="2971800" cy="458788"/>
+          </a:xfrm>
+          <a:prstGeom prst="rect">
+            <a:avLst/>
+          </a:prstGeom>
+        </p:spPr>
+        <p:txBody>
+          <a:bodyPr vert="horz" lIns="91440" tIns="45720" rIns="91440" bIns="45720" rtlCol="0"/>
+          <a:lstStyle>
+            <a:lvl1pPr algn="l">
+              <a:defRPr sz="1200"/>
+            </a:lvl1pPr>
+          </a:lstStyle>
+          <a:p>
+            <a:endParaRPr lang="en-US"/>
+          </a:p>
+        </p:txBody>
+      </p:sp>
+      <p:sp>
+        <p:nvSpPr>
+          <p:cNvPr id="3" name="Date Placeholder 2"/>
+          <p:cNvSpPr>
+            <a:spLocks noGrp="1"/>
+          </p:cNvSpPr>
+          <p:nvPr>
+            <p:ph type="dt" idx="1"/>
+          </p:nvPr>
+        </p:nvSpPr>
+        <p:spPr>
+          <a:xfrm>
+            <a:off x="3884613" y="0"/>
+            <a:ext cx="2971800" cy="458788"/>
+          </a:xfrm>
+          <a:prstGeom prst="rect">
+            <a:avLst/>
+          </a:prstGeom>
+        </p:spPr>
+        <p:txBody>
+          <a:bodyPr vert="horz" lIns="91440" tIns="45720" rIns="91440" bIns="45720" rtlCol="0"/>
+          <a:lstStyle>
+            <a:lvl1pPr algn="r">
+              <a:defRPr sz="1200"/>
+            </a:lvl1pPr>
+          </a:lstStyle>
+          <a:p>
+            <a:fld id="{8C6DE032-36B9-CE46-8B72-AD9B7CA615F9}" type="datetimeFigureOut">
+              <a:rPr lang="en-US" smtClean="0"/>
+              <a:t>1/19/22</a:t>
+            </a:fld>
+            <a:endParaRPr lang="en-US"/>
+          </a:p>
+        </p:txBody>
+      </p:sp>
+      <p:sp>
+        <p:nvSpPr>
+          <p:cNvPr id="4" name="Slide Image Placeholder 3"/>
+          <p:cNvSpPr>
+            <a:spLocks noGrp="1" noRot="1" noChangeAspect="1"/>
+          </p:cNvSpPr>
+          <p:nvPr>
+            <p:ph type="sldImg" idx="2"/>
+          </p:nvPr>
+        </p:nvSpPr>
+        <p:spPr>
+          <a:xfrm>
+            <a:off x="685800" y="1143000"/>
+            <a:ext cx="5486400" cy="3086100"/>
+          </a:xfrm>
+          <a:prstGeom prst="rect">
+            <a:avLst/>
+          </a:prstGeom>
+          <a:noFill/>
+          <a:ln w="12700">
+            <a:solidFill>
+              <a:prstClr val="black"/>
+            </a:solidFill>
+          </a:ln>
+        </p:spPr>
+        <p:txBody>
+          <a:bodyPr vert="horz" lIns="91440" tIns="45720" rIns="91440" bIns="45720" rtlCol="0" anchor="ctr"/>
+          <a:lstStyle/>
+          <a:p>
+            <a:endParaRPr lang="en-US"/>
+          </a:p>
+        </p:txBody>
+      </p:sp>
+      <p:sp>
+        <p:nvSpPr>
+          <p:cNvPr id="5" name="Notes Placeholder 4"/>
+          <p:cNvSpPr>
+            <a:spLocks noGrp="1"/>
+          </p:cNvSpPr>
+          <p:nvPr>
+            <p:ph type="body" sz="quarter" idx="3"/>
+          </p:nvPr>
+        </p:nvSpPr>
+        <p:spPr>
+          <a:xfrm>
+            <a:off x="685800" y="4400550"/>
+            <a:ext cx="5486400" cy="3600450"/>
+          </a:xfrm>
+          <a:prstGeom prst="rect">
+            <a:avLst/>
+          </a:prstGeom>
+        </p:spPr>
+        <p:txBody>
+          <a:bodyPr vert="horz" lIns="91440" tIns="45720" rIns="91440" bIns="45720" rtlCol="0"/>
+          <a:lstStyle/>
+          <a:p>
+            <a:pPr lvl="0"/>
+            <a:r>
+              <a:rPr lang="en-US"/>
+              <a:t>Click to edit Master text styles</a:t>
+            </a:r>
+          </a:p>
+          <a:p>
+            <a:pPr lvl="1"/>
+            <a:r>
+              <a:rPr lang="en-US"/>
+              <a:t>Second level</a:t>
+            </a:r>
+          </a:p>
+          <a:p>
+            <a:pPr lvl="2"/>
+            <a:r>
+              <a:rPr lang="en-US"/>
+              <a:t>Third level</a:t>
+            </a:r>
+          </a:p>
+          <a:p>
+            <a:pPr lvl="3"/>
+            <a:r>
+              <a:rPr lang="en-US"/>
+              <a:t>Fourth level</a:t>
+            </a:r>
+          </a:p>
+          <a:p>
+            <a:pPr lvl="4"/>
+            <a:r>
+              <a:rPr lang="en-US"/>
+              <a:t>Fifth level</a:t>
+            </a:r>
+          </a:p>
+        </p:txBody>
+      </p:sp>
+      <p:sp>
+        <p:nvSpPr>
+          <p:cNvPr id="6" name="Footer Placeholder 5"/>
+          <p:cNvSpPr>
+            <a:spLocks noGrp="1"/>
+          </p:cNvSpPr>
+          <p:nvPr>
+            <p:ph type="ftr" sz="quarter" idx="4"/>
+          </p:nvPr>
+        </p:nvSpPr>
+        <p:spPr>
+          <a:xfrm>
+            <a:off x="0" y="8685213"/>
+            <a:ext cx="2971800" cy="458787"/>
+          </a:xfrm>
+          <a:prstGeom prst="rect">
+            <a:avLst/>
+          </a:prstGeom>
+        </p:spPr>
+        <p:txBody>
+          <a:bodyPr vert="horz" lIns="91440" tIns="45720" rIns="91440" bIns="45720" rtlCol="0" anchor="b"/>
+          <a:lstStyle>
+            <a:lvl1pPr algn="l">
+              <a:defRPr sz="1200"/>
+            </a:lvl1pPr>
+          </a:lstStyle>
+          <a:p>
+            <a:endParaRPr lang="en-US"/>
+          </a:p>
+        </p:txBody>
+      </p:sp>
+      <p:sp>
+        <p:nvSpPr>
+          <p:cNvPr id="7" name="Slide Number Placeholder 6"/>
+          <p:cNvSpPr>
+            <a:spLocks noGrp="1"/>
+          </p:cNvSpPr>
+          <p:nvPr>
+            <p:ph type="sldNum" sz="quarter" idx="5"/>
+          </p:nvPr>
+        </p:nvSpPr>
+        <p:spPr>
+          <a:xfrm>
+            <a:off x="3884613" y="8685213"/>
+            <a:ext cx="2971800" cy="458787"/>
+          </a:xfrm>
+          <a:prstGeom prst="rect">
+            <a:avLst/>
+          </a:prstGeom>
+        </p:spPr>
+        <p:txBody>
+          <a:bodyPr vert="horz" lIns="91440" tIns="45720" rIns="91440" bIns="45720" rtlCol="0" anchor="b"/>
+          <a:lstStyle>
+            <a:lvl1pPr algn="r">
+              <a:defRPr sz="1200"/>
+            </a:lvl1pPr>
+          </a:lstStyle>
+          <a:p>
+            <a:fld id="{F524FF18-1B6C-C34C-8C0C-3F086FEA081C}" type="slidenum">
+              <a:rPr lang="en-US" smtClean="0"/>
+              <a:t>‹#›</a:t>
+            </a:fld>
+            <a:endParaRPr lang="en-US"/>
+          </a:p>
+        </p:txBody>
+      </p:sp>
+    </p:spTree>
+    <p:extLst>
+      <p:ext uri="{BB962C8B-B14F-4D97-AF65-F5344CB8AC3E}">
+        <p14:creationId xmlns:p14="http://schemas.microsoft.com/office/powerpoint/2010/main" val="447856432"/>
+      </p:ext>
+    </p:extLst>
+  </p:cSld>
+  <p:clrMap bg1="lt1" tx1="dk1" bg2="lt2" tx2="dk2" accent1="accent1" accent2="accent2" accent3="accent3" accent4="accent4" accent5="accent5" accent6="accent6" hlink="hlink" folHlink="folHlink"/>
+  <p:notesStyle>
+    <a:lvl1pPr marL="0" algn="l" defTabSz="914400" rtl="0" eaLnBrk="1" latinLnBrk="0" hangingPunct="1">
+      <a:defRPr sz="1200" kern="1200">
+        <a:solidFill>
+          <a:schemeClr val="tx1"/>
+        </a:solidFill>
+        <a:latin typeface="+mn-lt"/>
+        <a:ea typeface="+mn-ea"/>
+        <a:cs typeface="+mn-cs"/>
+      </a:defRPr>
+    </a:lvl1pPr>
+    <a:lvl2pPr marL="457200" algn="l" defTabSz="914400" rtl="0" eaLnBrk="1" latinLnBrk="0" hangingPunct="1">
+      <a:defRPr sz="1200" kern="1200">
+        <a:solidFill>
+          <a:schemeClr val="tx1"/>
+        </a:solidFill>
+        <a:latin typeface="+mn-lt"/>
+        <a:ea typeface="+mn-ea"/>
+        <a:cs typeface="+mn-cs"/>
+      </a:defRPr>
+    </a:lvl2pPr>
+    <a:lvl3pPr marL="914400" algn="l" defTabSz="914400" rtl="0" eaLnBrk="1" latinLnBrk="0" hangingPunct="1">
+      <a:defRPr sz="1200" kern="1200">
+        <a:solidFill>
+          <a:schemeClr val="tx1"/>
+        </a:solidFill>
+        <a:latin typeface="+mn-lt"/>
+        <a:ea typeface="+mn-ea"/>
+        <a:cs typeface="+mn-cs"/>
+      </a:defRPr>
+    </a:lvl3pPr>
+    <a:lvl4pPr marL="1371600" algn="l" defTabSz="914400" rtl="0" eaLnBrk="1" latinLnBrk="0" hangingPunct="1">
+      <a:defRPr sz="1200" kern="1200">
+        <a:solidFill>
+          <a:schemeClr val="tx1"/>
+        </a:solidFill>
+        <a:latin typeface="+mn-lt"/>
+        <a:ea typeface="+mn-ea"/>
+        <a:cs typeface="+mn-cs"/>
+      </a:defRPr>
+    </a:lvl4pPr>
+    <a:lvl5pPr marL="1828800" algn="l" defTabSz="914400" rtl="0" eaLnBrk="1" latinLnBrk="0" hangingPunct="1">
+      <a:defRPr sz="1200" kern="1200">
+        <a:solidFill>
+          <a:schemeClr val="tx1"/>
+        </a:solidFill>
+        <a:latin typeface="+mn-lt"/>
+        <a:ea typeface="+mn-ea"/>
+        <a:cs typeface="+mn-cs"/>
+      </a:defRPr>
+    </a:lvl5pPr>
+    <a:lvl6pPr marL="2286000" algn="l" defTabSz="914400" rtl="0" eaLnBrk="1" latinLnBrk="0" hangingPunct="1">
+      <a:defRPr sz="1200" kern="1200">
+        <a:solidFill>
+          <a:schemeClr val="tx1"/>
+        </a:solidFill>
+        <a:latin typeface="+mn-lt"/>
+        <a:ea typeface="+mn-ea"/>
+        <a:cs typeface="+mn-cs"/>
+      </a:defRPr>
+    </a:lvl6pPr>
+    <a:lvl7pPr marL="2743200" algn="l" defTabSz="914400" rtl="0" eaLnBrk="1" latinLnBrk="0" hangingPunct="1">
+      <a:defRPr sz="1200" kern="1200">
+        <a:solidFill>
+          <a:schemeClr val="tx1"/>
+        </a:solidFill>
+        <a:latin typeface="+mn-lt"/>
+        <a:ea typeface="+mn-ea"/>
+        <a:cs typeface="+mn-cs"/>
+      </a:defRPr>
+    </a:lvl7pPr>
+    <a:lvl8pPr marL="3200400" algn="l" defTabSz="914400" rtl="0" eaLnBrk="1" latinLnBrk="0" hangingPunct="1">
+      <a:defRPr sz="1200" kern="1200">
+        <a:solidFill>
+          <a:schemeClr val="tx1"/>
+        </a:solidFill>
+        <a:latin typeface="+mn-lt"/>
+        <a:ea typeface="+mn-ea"/>
+        <a:cs typeface="+mn-cs"/>
+      </a:defRPr>
+    </a:lvl8pPr>
+    <a:lvl9pPr marL="3657600" algn="l" defTabSz="914400" rtl="0" eaLnBrk="1" latinLnBrk="0" hangingPunct="1">
+      <a:defRPr sz="1200" kern="1200">
+        <a:solidFill>
+          <a:schemeClr val="tx1"/>
+        </a:solidFill>
+        <a:latin typeface="+mn-lt"/>
+        <a:ea typeface="+mn-ea"/>
+        <a:cs typeface="+mn-cs"/>
+      </a:defRPr>
+    </a:lvl9pPr>
+  </p:notesStyle>
+</p:notesMaster>
+</file>
+
+<file path=ppt/notesSlides/notesSlide1.xml><?xml version="1.0" encoding="utf-8"?>
+<p:notes xmlns:a="http://schemas.openxmlformats.org/drawingml/2006/main" xmlns:r="http://schemas.openxmlformats.org/officeDocument/2006/relationships" xmlns:p="http://schemas.openxmlformats.org/presentationml/2006/main">
+  <p:cSld>
+    <p:spTree>
+      <p:nvGrpSpPr>
+        <p:cNvPr id="1" name=""/>
+        <p:cNvGrpSpPr/>
+        <p:nvPr/>
+      </p:nvGrpSpPr>
+      <p:grpSpPr>
+        <a:xfrm>
+          <a:off x="0" y="0"/>
+          <a:ext cx="0" cy="0"/>
+          <a:chOff x="0" y="0"/>
+          <a:chExt cx="0" cy="0"/>
+        </a:xfrm>
+      </p:grpSpPr>
+      <p:sp>
+        <p:nvSpPr>
+          <p:cNvPr id="2" name="Slide Image Placeholder 1"/>
+          <p:cNvSpPr>
+            <a:spLocks noGrp="1" noRot="1" noChangeAspect="1"/>
+          </p:cNvSpPr>
+          <p:nvPr>
+            <p:ph type="sldImg"/>
+          </p:nvPr>
+        </p:nvSpPr>
+        <p:spPr/>
+      </p:sp>
+      <p:sp>
+        <p:nvSpPr>
+          <p:cNvPr id="3" name="Notes Placeholder 2"/>
+          <p:cNvSpPr>
+            <a:spLocks noGrp="1"/>
+          </p:cNvSpPr>
+          <p:nvPr>
+            <p:ph type="body" idx="1"/>
+          </p:nvPr>
+        </p:nvSpPr>
+        <p:spPr/>
+        <p:txBody>
+          <a:bodyPr/>
+          <a:lstStyle/>
+          <a:p>
+            <a:endParaRPr lang="en-US" dirty="0"/>
+          </a:p>
+        </p:txBody>
+      </p:sp>
+      <p:sp>
+        <p:nvSpPr>
+          <p:cNvPr id="4" name="Slide Number Placeholder 3"/>
+          <p:cNvSpPr>
+            <a:spLocks noGrp="1"/>
+          </p:cNvSpPr>
+          <p:nvPr>
+            <p:ph type="sldNum" sz="quarter" idx="5"/>
+          </p:nvPr>
+        </p:nvSpPr>
+        <p:spPr/>
+        <p:txBody>
+          <a:bodyPr/>
+          <a:lstStyle/>
+          <a:p>
+            <a:fld id="{F524FF18-1B6C-C34C-8C0C-3F086FEA081C}" type="slidenum">
+              <a:rPr lang="en-US" smtClean="0"/>
+              <a:t>1</a:t>
+            </a:fld>
+            <a:endParaRPr lang="en-US"/>
+          </a:p>
+        </p:txBody>
+      </p:sp>
+    </p:spTree>
+    <p:extLst>
+      <p:ext uri="{BB962C8B-B14F-4D97-AF65-F5344CB8AC3E}">
+        <p14:creationId xmlns:p14="http://schemas.microsoft.com/office/powerpoint/2010/main" val="3767946771"/>
+      </p:ext>
+    </p:extLst>
+  </p:cSld>
+  <p:clrMapOvr>
+    <a:masterClrMapping/>
+  </p:clrMapOvr>
+</p:notes>
 </file>
 
 <file path=ppt/slideLayouts/slideLayout1.xml><?xml version="1.0" encoding="utf-8"?>
@@ -254,7 +695,7 @@
           <a:p>
             <a:fld id="{2867E21F-2328-CC4B-802A-C520CA2AB107}" type="datetimeFigureOut">
               <a:rPr lang="en-US" smtClean="0"/>
-              <a:t>1/18/22</a:t>
+              <a:t>1/19/22</a:t>
             </a:fld>
             <a:endParaRPr lang="en-US"/>
           </a:p>
@@ -452,7 +893,7 @@
           <a:p>
             <a:fld id="{2867E21F-2328-CC4B-802A-C520CA2AB107}" type="datetimeFigureOut">
               <a:rPr lang="en-US" smtClean="0"/>
-              <a:t>1/18/22</a:t>
+              <a:t>1/19/22</a:t>
             </a:fld>
             <a:endParaRPr lang="en-US"/>
           </a:p>
@@ -660,7 +1101,7 @@
           <a:p>
             <a:fld id="{2867E21F-2328-CC4B-802A-C520CA2AB107}" type="datetimeFigureOut">
               <a:rPr lang="en-US" smtClean="0"/>
-              <a:t>1/18/22</a:t>
+              <a:t>1/19/22</a:t>
             </a:fld>
             <a:endParaRPr lang="en-US"/>
           </a:p>
@@ -858,7 +1299,7 @@
           <a:p>
             <a:fld id="{2867E21F-2328-CC4B-802A-C520CA2AB107}" type="datetimeFigureOut">
               <a:rPr lang="en-US" smtClean="0"/>
-              <a:t>1/18/22</a:t>
+              <a:t>1/19/22</a:t>
             </a:fld>
             <a:endParaRPr lang="en-US"/>
           </a:p>
@@ -1133,7 +1574,7 @@
           <a:p>
             <a:fld id="{2867E21F-2328-CC4B-802A-C520CA2AB107}" type="datetimeFigureOut">
               <a:rPr lang="en-US" smtClean="0"/>
-              <a:t>1/18/22</a:t>
+              <a:t>1/19/22</a:t>
             </a:fld>
             <a:endParaRPr lang="en-US"/>
           </a:p>
@@ -1398,7 +1839,7 @@
           <a:p>
             <a:fld id="{2867E21F-2328-CC4B-802A-C520CA2AB107}" type="datetimeFigureOut">
               <a:rPr lang="en-US" smtClean="0"/>
-              <a:t>1/18/22</a:t>
+              <a:t>1/19/22</a:t>
             </a:fld>
             <a:endParaRPr lang="en-US"/>
           </a:p>
@@ -1810,7 +2251,7 @@
           <a:p>
             <a:fld id="{2867E21F-2328-CC4B-802A-C520CA2AB107}" type="datetimeFigureOut">
               <a:rPr lang="en-US" smtClean="0"/>
-              <a:t>1/18/22</a:t>
+              <a:t>1/19/22</a:t>
             </a:fld>
             <a:endParaRPr lang="en-US"/>
           </a:p>
@@ -1951,7 +2392,7 @@
           <a:p>
             <a:fld id="{2867E21F-2328-CC4B-802A-C520CA2AB107}" type="datetimeFigureOut">
               <a:rPr lang="en-US" smtClean="0"/>
-              <a:t>1/18/22</a:t>
+              <a:t>1/19/22</a:t>
             </a:fld>
             <a:endParaRPr lang="en-US"/>
           </a:p>
@@ -2064,7 +2505,7 @@
           <a:p>
             <a:fld id="{2867E21F-2328-CC4B-802A-C520CA2AB107}" type="datetimeFigureOut">
               <a:rPr lang="en-US" smtClean="0"/>
-              <a:t>1/18/22</a:t>
+              <a:t>1/19/22</a:t>
             </a:fld>
             <a:endParaRPr lang="en-US"/>
           </a:p>
@@ -2375,7 +2816,7 @@
           <a:p>
             <a:fld id="{2867E21F-2328-CC4B-802A-C520CA2AB107}" type="datetimeFigureOut">
               <a:rPr lang="en-US" smtClean="0"/>
-              <a:t>1/18/22</a:t>
+              <a:t>1/19/22</a:t>
             </a:fld>
             <a:endParaRPr lang="en-US"/>
           </a:p>
@@ -2663,7 +3104,7 @@
           <a:p>
             <a:fld id="{2867E21F-2328-CC4B-802A-C520CA2AB107}" type="datetimeFigureOut">
               <a:rPr lang="en-US" smtClean="0"/>
-              <a:t>1/18/22</a:t>
+              <a:t>1/19/22</a:t>
             </a:fld>
             <a:endParaRPr lang="en-US"/>
           </a:p>
@@ -2904,7 +3345,7 @@
           <a:p>
             <a:fld id="{2867E21F-2328-CC4B-802A-C520CA2AB107}" type="datetimeFigureOut">
               <a:rPr lang="en-US" smtClean="0"/>
-              <a:t>1/18/22</a:t>
+              <a:t>1/19/22</a:t>
             </a:fld>
             <a:endParaRPr lang="en-US"/>
           </a:p>
@@ -3336,14 +3777,14 @@
           <p:nvPr/>
         </p:nvPicPr>
         <p:blipFill>
-          <a:blip r:embed="rId2"/>
+          <a:blip r:embed="rId3"/>
           <a:stretch>
             <a:fillRect/>
           </a:stretch>
         </p:blipFill>
         <p:spPr>
           <a:xfrm>
-            <a:off x="1746981" y="255182"/>
+            <a:off x="1630232" y="174497"/>
             <a:ext cx="3755852" cy="2317897"/>
           </a:xfrm>
           <a:prstGeom prst="rect">
@@ -3357,36 +3798,6 @@
             <a:extLst>
               <a:ext uri="{FF2B5EF4-FFF2-40B4-BE49-F238E27FC236}">
                 <a16:creationId xmlns:a16="http://schemas.microsoft.com/office/drawing/2014/main" id="{599C7BE1-8DA3-BC42-BEA2-74FFCF960D8C}"/>
-              </a:ext>
-            </a:extLst>
-          </p:cNvPr>
-          <p:cNvPicPr>
-            <a:picLocks noChangeAspect="1"/>
-          </p:cNvPicPr>
-          <p:nvPr/>
-        </p:nvPicPr>
-        <p:blipFill>
-          <a:blip r:embed="rId3"/>
-          <a:stretch>
-            <a:fillRect/>
-          </a:stretch>
-        </p:blipFill>
-        <p:spPr>
-          <a:xfrm>
-            <a:off x="1593112" y="2344477"/>
-            <a:ext cx="4548375" cy="2806997"/>
-          </a:xfrm>
-          <a:prstGeom prst="rect">
-            <a:avLst/>
-          </a:prstGeom>
-        </p:spPr>
-      </p:pic>
-      <p:pic>
-        <p:nvPicPr>
-          <p:cNvPr id="21" name="Picture 20">
-            <a:extLst>
-              <a:ext uri="{FF2B5EF4-FFF2-40B4-BE49-F238E27FC236}">
-                <a16:creationId xmlns:a16="http://schemas.microsoft.com/office/drawing/2014/main" id="{52289652-6B1C-A945-AAAB-769A87AB7098}"/>
               </a:ext>
             </a:extLst>
           </p:cNvPr>
@@ -3403,8 +3814,8 @@
         </p:blipFill>
         <p:spPr>
           <a:xfrm>
-            <a:off x="1764593" y="4556048"/>
-            <a:ext cx="4231397" cy="2317897"/>
+            <a:off x="1606103" y="2205661"/>
+            <a:ext cx="4548375" cy="2806997"/>
           </a:xfrm>
           <a:prstGeom prst="rect">
             <a:avLst/>
@@ -3413,10 +3824,10 @@
       </p:pic>
       <p:pic>
         <p:nvPicPr>
-          <p:cNvPr id="23" name="Picture 22">
-            <a:extLst>
-              <a:ext uri="{FF2B5EF4-FFF2-40B4-BE49-F238E27FC236}">
-                <a16:creationId xmlns:a16="http://schemas.microsoft.com/office/drawing/2014/main" id="{2106A970-4776-C94C-8CF7-CC8711DDE002}"/>
+          <p:cNvPr id="21" name="Picture 20">
+            <a:extLst>
+              <a:ext uri="{FF2B5EF4-FFF2-40B4-BE49-F238E27FC236}">
+                <a16:creationId xmlns:a16="http://schemas.microsoft.com/office/drawing/2014/main" id="{52289652-6B1C-A945-AAAB-769A87AB7098}"/>
               </a:ext>
             </a:extLst>
           </p:cNvPr>
@@ -3427,14 +3838,43 @@
         </p:nvPicPr>
         <p:blipFill>
           <a:blip r:embed="rId5"/>
+          <a:srcRect/>
+          <a:stretch/>
+        </p:blipFill>
+        <p:spPr>
+          <a:xfrm>
+            <a:off x="1868005" y="4513523"/>
+            <a:ext cx="3755851" cy="2317897"/>
+          </a:xfrm>
+          <a:prstGeom prst="rect">
+            <a:avLst/>
+          </a:prstGeom>
+        </p:spPr>
+      </p:pic>
+      <p:pic>
+        <p:nvPicPr>
+          <p:cNvPr id="3" name="Picture 2">
+            <a:extLst>
+              <a:ext uri="{FF2B5EF4-FFF2-40B4-BE49-F238E27FC236}">
+                <a16:creationId xmlns:a16="http://schemas.microsoft.com/office/drawing/2014/main" id="{F5EE1BDD-9433-7748-AE41-42F079040760}"/>
+              </a:ext>
+            </a:extLst>
+          </p:cNvPr>
+          <p:cNvPicPr>
+            <a:picLocks noChangeAspect="1"/>
+          </p:cNvPicPr>
+          <p:nvPr/>
+        </p:nvPicPr>
+        <p:blipFill>
+          <a:blip r:embed="rId6"/>
           <a:stretch>
             <a:fillRect/>
           </a:stretch>
         </p:blipFill>
         <p:spPr>
           <a:xfrm>
-            <a:off x="6096000" y="425302"/>
-            <a:ext cx="4502888" cy="6432697"/>
+            <a:off x="6689169" y="360321"/>
+            <a:ext cx="4548375" cy="6497679"/>
           </a:xfrm>
           <a:prstGeom prst="rect">
             <a:avLst/>
@@ -3747,4 +4187,299 @@
     </a:ext>
   </a:extLst>
 </a:theme>
+</file>
+
+<file path=ppt/theme/theme2.xml><?xml version="1.0" encoding="utf-8"?>
+<a:theme xmlns:a="http://schemas.openxmlformats.org/drawingml/2006/main" name="Office Theme">
+  <a:themeElements>
+    <a:clrScheme name="Office">
+      <a:dk1>
+        <a:sysClr val="windowText" lastClr="000000"/>
+      </a:dk1>
+      <a:lt1>
+        <a:sysClr val="window" lastClr="FFFFFF"/>
+      </a:lt1>
+      <a:dk2>
+        <a:srgbClr val="44546A"/>
+      </a:dk2>
+      <a:lt2>
+        <a:srgbClr val="E7E6E6"/>
+      </a:lt2>
+      <a:accent1>
+        <a:srgbClr val="4472C4"/>
+      </a:accent1>
+      <a:accent2>
+        <a:srgbClr val="ED7D31"/>
+      </a:accent2>
+      <a:accent3>
+        <a:srgbClr val="A5A5A5"/>
+      </a:accent3>
+      <a:accent4>
+        <a:srgbClr val="FFC000"/>
+      </a:accent4>
+      <a:accent5>
+        <a:srgbClr val="5B9BD5"/>
+      </a:accent5>
+      <a:accent6>
+        <a:srgbClr val="70AD47"/>
+      </a:accent6>
+      <a:hlink>
+        <a:srgbClr val="0563C1"/>
+      </a:hlink>
+      <a:folHlink>
+        <a:srgbClr val="954F72"/>
+      </a:folHlink>
+    </a:clrScheme>
+    <a:fontScheme name="Office">
+      <a:majorFont>
+        <a:latin typeface="Calibri Light" panose="020F0302020204030204"/>
+        <a:ea typeface=""/>
+        <a:cs typeface=""/>
+        <a:font script="Jpan" typeface="游ゴシック Light"/>
+        <a:font script="Hang" typeface="맑은 고딕"/>
+        <a:font script="Hans" typeface="等线 Light"/>
+        <a:font script="Hant" typeface="新細明體"/>
+        <a:font script="Arab" typeface="Times New Roman"/>
+        <a:font script="Hebr" typeface="Times New Roman"/>
+        <a:font script="Thai" typeface="Angsana New"/>
+        <a:font script="Ethi" typeface="Nyala"/>
+        <a:font script="Beng" typeface="Vrinda"/>
+        <a:font script="Gujr" typeface="Shruti"/>
+        <a:font script="Khmr" typeface="MoolBoran"/>
+        <a:font script="Knda" typeface="Tunga"/>
+        <a:font script="Guru" typeface="Raavi"/>
+        <a:font script="Cans" typeface="Euphemia"/>
+        <a:font script="Cher" typeface="Plantagenet Cherokee"/>
+        <a:font script="Yiii" typeface="Microsoft Yi Baiti"/>
+        <a:font script="Tibt" typeface="Microsoft Himalaya"/>
+        <a:font script="Thaa" typeface="MV Boli"/>
+        <a:font script="Deva" typeface="Mangal"/>
+        <a:font script="Telu" typeface="Gautami"/>
+        <a:font script="Taml" typeface="Latha"/>
+        <a:font script="Syrc" typeface="Estrangelo Edessa"/>
+        <a:font script="Orya" typeface="Kalinga"/>
+        <a:font script="Mlym" typeface="Kartika"/>
+        <a:font script="Laoo" typeface="DokChampa"/>
+        <a:font script="Sinh" typeface="Iskoola Pota"/>
+        <a:font script="Mong" typeface="Mongolian Baiti"/>
+        <a:font script="Viet" typeface="Times New Roman"/>
+        <a:font script="Uigh" typeface="Microsoft Uighur"/>
+        <a:font script="Geor" typeface="Sylfaen"/>
+        <a:font script="Armn" typeface="Arial"/>
+        <a:font script="Bugi" typeface="Leelawadee UI"/>
+        <a:font script="Bopo" typeface="Microsoft JhengHei"/>
+        <a:font script="Java" typeface="Javanese Text"/>
+        <a:font script="Lisu" typeface="Segoe UI"/>
+        <a:font script="Mymr" typeface="Myanmar Text"/>
+        <a:font script="Nkoo" typeface="Ebrima"/>
+        <a:font script="Olck" typeface="Nirmala UI"/>
+        <a:font script="Osma" typeface="Ebrima"/>
+        <a:font script="Phag" typeface="Phagspa"/>
+        <a:font script="Syrn" typeface="Estrangelo Edessa"/>
+        <a:font script="Syrj" typeface="Estrangelo Edessa"/>
+        <a:font script="Syre" typeface="Estrangelo Edessa"/>
+        <a:font script="Sora" typeface="Nirmala UI"/>
+        <a:font script="Tale" typeface="Microsoft Tai Le"/>
+        <a:font script="Talu" typeface="Microsoft New Tai Lue"/>
+        <a:font script="Tfng" typeface="Ebrima"/>
+      </a:majorFont>
+      <a:minorFont>
+        <a:latin typeface="Calibri" panose="020F0502020204030204"/>
+        <a:ea typeface=""/>
+        <a:cs typeface=""/>
+        <a:font script="Jpan" typeface="游ゴシック"/>
+        <a:font script="Hang" typeface="맑은 고딕"/>
+        <a:font script="Hans" typeface="等线"/>
+        <a:font script="Hant" typeface="新細明體"/>
+        <a:font script="Arab" typeface="Arial"/>
+        <a:font script="Hebr" typeface="Arial"/>
+        <a:font script="Thai" typeface="Cordia New"/>
+        <a:font script="Ethi" typeface="Nyala"/>
+        <a:font script="Beng" typeface="Vrinda"/>
+        <a:font script="Gujr" typeface="Shruti"/>
+        <a:font script="Khmr" typeface="DaunPenh"/>
+        <a:font script="Knda" typeface="Tunga"/>
+        <a:font script="Guru" typeface="Raavi"/>
+        <a:font script="Cans" typeface="Euphemia"/>
+        <a:font script="Cher" typeface="Plantagenet Cherokee"/>
+        <a:font script="Yiii" typeface="Microsoft Yi Baiti"/>
+        <a:font script="Tibt" typeface="Microsoft Himalaya"/>
+        <a:font script="Thaa" typeface="MV Boli"/>
+        <a:font script="Deva" typeface="Mangal"/>
+        <a:font script="Telu" typeface="Gautami"/>
+        <a:font script="Taml" typeface="Latha"/>
+        <a:font script="Syrc" typeface="Estrangelo Edessa"/>
+        <a:font script="Orya" typeface="Kalinga"/>
+        <a:font script="Mlym" typeface="Kartika"/>
+        <a:font script="Laoo" typeface="DokChampa"/>
+        <a:font script="Sinh" typeface="Iskoola Pota"/>
+        <a:font script="Mong" typeface="Mongolian Baiti"/>
+        <a:font script="Viet" typeface="Arial"/>
+        <a:font script="Uigh" typeface="Microsoft Uighur"/>
+        <a:font script="Geor" typeface="Sylfaen"/>
+        <a:font script="Armn" typeface="Arial"/>
+        <a:font script="Bugi" typeface="Leelawadee UI"/>
+        <a:font script="Bopo" typeface="Microsoft JhengHei"/>
+        <a:font script="Java" typeface="Javanese Text"/>
+        <a:font script="Lisu" typeface="Segoe UI"/>
+        <a:font script="Mymr" typeface="Myanmar Text"/>
+        <a:font script="Nkoo" typeface="Ebrima"/>
+        <a:font script="Olck" typeface="Nirmala UI"/>
+        <a:font script="Osma" typeface="Ebrima"/>
+        <a:font script="Phag" typeface="Phagspa"/>
+        <a:font script="Syrn" typeface="Estrangelo Edessa"/>
+        <a:font script="Syrj" typeface="Estrangelo Edessa"/>
+        <a:font script="Syre" typeface="Estrangelo Edessa"/>
+        <a:font script="Sora" typeface="Nirmala UI"/>
+        <a:font script="Tale" typeface="Microsoft Tai Le"/>
+        <a:font script="Talu" typeface="Microsoft New Tai Lue"/>
+        <a:font script="Tfng" typeface="Ebrima"/>
+      </a:minorFont>
+    </a:fontScheme>
+    <a:fmtScheme name="Office">
+      <a:fillStyleLst>
+        <a:solidFill>
+          <a:schemeClr val="phClr"/>
+        </a:solidFill>
+        <a:gradFill rotWithShape="1">
+          <a:gsLst>
+            <a:gs pos="0">
+              <a:schemeClr val="phClr">
+                <a:lumMod val="110000"/>
+                <a:satMod val="105000"/>
+                <a:tint val="67000"/>
+              </a:schemeClr>
+            </a:gs>
+            <a:gs pos="50000">
+              <a:schemeClr val="phClr">
+                <a:lumMod val="105000"/>
+                <a:satMod val="103000"/>
+                <a:tint val="73000"/>
+              </a:schemeClr>
+            </a:gs>
+            <a:gs pos="100000">
+              <a:schemeClr val="phClr">
+                <a:lumMod val="105000"/>
+                <a:satMod val="109000"/>
+                <a:tint val="81000"/>
+              </a:schemeClr>
+            </a:gs>
+          </a:gsLst>
+          <a:lin ang="5400000" scaled="0"/>
+        </a:gradFill>
+        <a:gradFill rotWithShape="1">
+          <a:gsLst>
+            <a:gs pos="0">
+              <a:schemeClr val="phClr">
+                <a:satMod val="103000"/>
+                <a:lumMod val="102000"/>
+                <a:tint val="94000"/>
+              </a:schemeClr>
+            </a:gs>
+            <a:gs pos="50000">
+              <a:schemeClr val="phClr">
+                <a:satMod val="110000"/>
+                <a:lumMod val="100000"/>
+                <a:shade val="100000"/>
+              </a:schemeClr>
+            </a:gs>
+            <a:gs pos="100000">
+              <a:schemeClr val="phClr">
+                <a:lumMod val="99000"/>
+                <a:satMod val="120000"/>
+                <a:shade val="78000"/>
+              </a:schemeClr>
+            </a:gs>
+          </a:gsLst>
+          <a:lin ang="5400000" scaled="0"/>
+        </a:gradFill>
+      </a:fillStyleLst>
+      <a:lnStyleLst>
+        <a:ln w="6350" cap="flat" cmpd="sng" algn="ctr">
+          <a:solidFill>
+            <a:schemeClr val="phClr"/>
+          </a:solidFill>
+          <a:prstDash val="solid"/>
+          <a:miter lim="800000"/>
+        </a:ln>
+        <a:ln w="12700" cap="flat" cmpd="sng" algn="ctr">
+          <a:solidFill>
+            <a:schemeClr val="phClr"/>
+          </a:solidFill>
+          <a:prstDash val="solid"/>
+          <a:miter lim="800000"/>
+        </a:ln>
+        <a:ln w="19050" cap="flat" cmpd="sng" algn="ctr">
+          <a:solidFill>
+            <a:schemeClr val="phClr"/>
+          </a:solidFill>
+          <a:prstDash val="solid"/>
+          <a:miter lim="800000"/>
+        </a:ln>
+      </a:lnStyleLst>
+      <a:effectStyleLst>
+        <a:effectStyle>
+          <a:effectLst/>
+        </a:effectStyle>
+        <a:effectStyle>
+          <a:effectLst/>
+        </a:effectStyle>
+        <a:effectStyle>
+          <a:effectLst>
+            <a:outerShdw blurRad="57150" dist="19050" dir="5400000" algn="ctr" rotWithShape="0">
+              <a:srgbClr val="000000">
+                <a:alpha val="63000"/>
+              </a:srgbClr>
+            </a:outerShdw>
+          </a:effectLst>
+        </a:effectStyle>
+      </a:effectStyleLst>
+      <a:bgFillStyleLst>
+        <a:solidFill>
+          <a:schemeClr val="phClr"/>
+        </a:solidFill>
+        <a:solidFill>
+          <a:schemeClr val="phClr">
+            <a:tint val="95000"/>
+            <a:satMod val="170000"/>
+          </a:schemeClr>
+        </a:solidFill>
+        <a:gradFill rotWithShape="1">
+          <a:gsLst>
+            <a:gs pos="0">
+              <a:schemeClr val="phClr">
+                <a:tint val="93000"/>
+                <a:satMod val="150000"/>
+                <a:shade val="98000"/>
+                <a:lumMod val="102000"/>
+              </a:schemeClr>
+            </a:gs>
+            <a:gs pos="50000">
+              <a:schemeClr val="phClr">
+                <a:tint val="98000"/>
+                <a:satMod val="130000"/>
+                <a:shade val="90000"/>
+                <a:lumMod val="103000"/>
+              </a:schemeClr>
+            </a:gs>
+            <a:gs pos="100000">
+              <a:schemeClr val="phClr">
+                <a:shade val="63000"/>
+                <a:satMod val="120000"/>
+              </a:schemeClr>
+            </a:gs>
+          </a:gsLst>
+          <a:lin ang="5400000" scaled="0"/>
+        </a:gradFill>
+      </a:bgFillStyleLst>
+    </a:fmtScheme>
+  </a:themeElements>
+  <a:objectDefaults/>
+  <a:extraClrSchemeLst/>
+  <a:extLst>
+    <a:ext uri="{05A4C25C-085E-4340-85A3-A5531E510DB2}">
+      <thm15:themeFamily xmlns:thm15="http://schemas.microsoft.com/office/thememl/2012/main" name="Office Theme" id="{62F939B6-93AF-4DB8-9C6B-D6C7DFDC589F}" vid="{4A3C46E8-61CC-4603-A589-7422A47A8E4A}"/>
+    </a:ext>
+  </a:extLst>
+</a:theme>
 </file>
</xml_diff>

<commit_message>
testing of combined chemical vs. controls
</commit_message>
<xml_diff>
--- a/Figures/Combined Plots/Combined_FiguresPPT.pptx
+++ b/Figures/Combined Plots/Combined_FiguresPPT.pptx
@@ -5,10 +5,11 @@
     <p:sldMasterId id="2147483648" r:id="rId1"/>
   </p:sldMasterIdLst>
   <p:notesMasterIdLst>
-    <p:notesMasterId r:id="rId3"/>
+    <p:notesMasterId r:id="rId4"/>
   </p:notesMasterIdLst>
   <p:sldIdLst>
     <p:sldId id="256" r:id="rId2"/>
+    <p:sldId id="257" r:id="rId3"/>
   </p:sldIdLst>
   <p:sldSz cx="12192000" cy="6858000"/>
   <p:notesSz cx="6858000" cy="9144000"/>
@@ -3784,7 +3785,7 @@
         </p:blipFill>
         <p:spPr>
           <a:xfrm>
-            <a:off x="1630232" y="174497"/>
+            <a:off x="299144" y="267095"/>
             <a:ext cx="3755852" cy="2317897"/>
           </a:xfrm>
           <a:prstGeom prst="rect">
@@ -3814,8 +3815,8 @@
         </p:blipFill>
         <p:spPr>
           <a:xfrm>
-            <a:off x="1606103" y="2205661"/>
-            <a:ext cx="4548375" cy="2806997"/>
+            <a:off x="299144" y="2344477"/>
+            <a:ext cx="4087661" cy="2806997"/>
           </a:xfrm>
           <a:prstGeom prst="rect">
             <a:avLst/>
@@ -3843,7 +3844,7 @@
         </p:blipFill>
         <p:spPr>
           <a:xfrm>
-            <a:off x="1868005" y="4513523"/>
+            <a:off x="398020" y="4273009"/>
             <a:ext cx="3755851" cy="2317897"/>
           </a:xfrm>
           <a:prstGeom prst="rect">
@@ -3873,8 +3874,38 @@
         </p:blipFill>
         <p:spPr>
           <a:xfrm>
-            <a:off x="6689169" y="360321"/>
+            <a:off x="3794485" y="360321"/>
             <a:ext cx="4548375" cy="6497679"/>
+          </a:xfrm>
+          <a:prstGeom prst="rect">
+            <a:avLst/>
+          </a:prstGeom>
+        </p:spPr>
+      </p:pic>
+      <p:pic>
+        <p:nvPicPr>
+          <p:cNvPr id="4" name="Picture 3">
+            <a:extLst>
+              <a:ext uri="{FF2B5EF4-FFF2-40B4-BE49-F238E27FC236}">
+                <a16:creationId xmlns:a16="http://schemas.microsoft.com/office/drawing/2014/main" id="{6F6A4B4F-3554-DA4C-A470-786B82B2A826}"/>
+              </a:ext>
+            </a:extLst>
+          </p:cNvPr>
+          <p:cNvPicPr>
+            <a:picLocks noChangeAspect="1"/>
+          </p:cNvPicPr>
+          <p:nvPr/>
+        </p:nvPicPr>
+        <p:blipFill>
+          <a:blip r:embed="rId7"/>
+          <a:stretch>
+            <a:fillRect/>
+          </a:stretch>
+        </p:blipFill>
+        <p:spPr>
+          <a:xfrm>
+            <a:off x="7750540" y="485499"/>
+            <a:ext cx="4208526" cy="6012180"/>
           </a:xfrm>
           <a:prstGeom prst="rect">
             <a:avLst/>
@@ -3885,6 +3916,86 @@
     <p:extLst>
       <p:ext uri="{BB962C8B-B14F-4D97-AF65-F5344CB8AC3E}">
         <p14:creationId xmlns:p14="http://schemas.microsoft.com/office/powerpoint/2010/main" val="2455560790"/>
+      </p:ext>
+    </p:extLst>
+  </p:cSld>
+  <p:clrMapOvr>
+    <a:masterClrMapping/>
+  </p:clrMapOvr>
+</p:sld>
+</file>
+
+<file path=ppt/slides/slide2.xml><?xml version="1.0" encoding="utf-8"?>
+<p:sld xmlns:a="http://schemas.openxmlformats.org/drawingml/2006/main" xmlns:r="http://schemas.openxmlformats.org/officeDocument/2006/relationships" xmlns:p="http://schemas.openxmlformats.org/presentationml/2006/main">
+  <p:cSld>
+    <p:spTree>
+      <p:nvGrpSpPr>
+        <p:cNvPr id="1" name=""/>
+        <p:cNvGrpSpPr/>
+        <p:nvPr/>
+      </p:nvGrpSpPr>
+      <p:grpSpPr>
+        <a:xfrm>
+          <a:off x="0" y="0"/>
+          <a:ext cx="0" cy="0"/>
+          <a:chOff x="0" y="0"/>
+          <a:chExt cx="0" cy="0"/>
+        </a:xfrm>
+      </p:grpSpPr>
+      <p:sp>
+        <p:nvSpPr>
+          <p:cNvPr id="2" name="Title 1">
+            <a:extLst>
+              <a:ext uri="{FF2B5EF4-FFF2-40B4-BE49-F238E27FC236}">
+                <a16:creationId xmlns:a16="http://schemas.microsoft.com/office/drawing/2014/main" id="{3F87BA59-542C-9341-83D5-4938A47A312D}"/>
+              </a:ext>
+            </a:extLst>
+          </p:cNvPr>
+          <p:cNvSpPr>
+            <a:spLocks noGrp="1"/>
+          </p:cNvSpPr>
+          <p:nvPr>
+            <p:ph type="title"/>
+          </p:nvPr>
+        </p:nvSpPr>
+        <p:spPr/>
+        <p:txBody>
+          <a:bodyPr/>
+          <a:lstStyle/>
+          <a:p>
+            <a:endParaRPr lang="en-US"/>
+          </a:p>
+        </p:txBody>
+      </p:sp>
+      <p:sp>
+        <p:nvSpPr>
+          <p:cNvPr id="3" name="Content Placeholder 2">
+            <a:extLst>
+              <a:ext uri="{FF2B5EF4-FFF2-40B4-BE49-F238E27FC236}">
+                <a16:creationId xmlns:a16="http://schemas.microsoft.com/office/drawing/2014/main" id="{7556C067-3F01-1043-85F4-A88383FDF4A0}"/>
+              </a:ext>
+            </a:extLst>
+          </p:cNvPr>
+          <p:cNvSpPr>
+            <a:spLocks noGrp="1"/>
+          </p:cNvSpPr>
+          <p:nvPr>
+            <p:ph idx="1"/>
+          </p:nvPr>
+        </p:nvSpPr>
+        <p:spPr/>
+        <p:txBody>
+          <a:bodyPr/>
+          <a:lstStyle/>
+          <a:p>
+            <a:endParaRPr lang="en-US"/>
+          </a:p>
+        </p:txBody>
+      </p:sp>
+    </p:spTree>
+    <p:extLst>
+      <p:ext uri="{BB962C8B-B14F-4D97-AF65-F5344CB8AC3E}">
+        <p14:creationId xmlns:p14="http://schemas.microsoft.com/office/powerpoint/2010/main" val="681673331"/>
       </p:ext>
     </p:extLst>
   </p:cSld>

</xml_diff>

<commit_message>
updating ITS figures for lightning talk
</commit_message>
<xml_diff>
--- a/Figures/Combined Plots/Combined_FiguresPPT.pptx
+++ b/Figures/Combined Plots/Combined_FiguresPPT.pptx
@@ -5,11 +5,12 @@
     <p:sldMasterId id="2147483648" r:id="rId1"/>
   </p:sldMasterIdLst>
   <p:notesMasterIdLst>
-    <p:notesMasterId r:id="rId4"/>
+    <p:notesMasterId r:id="rId5"/>
   </p:notesMasterIdLst>
   <p:sldIdLst>
     <p:sldId id="256" r:id="rId2"/>
     <p:sldId id="258" r:id="rId3"/>
+    <p:sldId id="259" r:id="rId4"/>
   </p:sldIdLst>
   <p:sldSz cx="12192000" cy="6858000"/>
   <p:notesSz cx="6858000" cy="9144000"/>
@@ -198,7 +199,7 @@
           <a:p>
             <a:fld id="{8C6DE032-36B9-CE46-8B72-AD9B7CA615F9}" type="datetimeFigureOut">
               <a:rPr lang="en-US" smtClean="0"/>
-              <a:t>1/19/22</a:t>
+              <a:t>1/31/22</a:t>
             </a:fld>
             <a:endParaRPr lang="en-US"/>
           </a:p>
@@ -633,6 +634,90 @@
 </p:notes>
 </file>
 
+<file path=ppt/notesSlides/notesSlide3.xml><?xml version="1.0" encoding="utf-8"?>
+<p:notes xmlns:a="http://schemas.openxmlformats.org/drawingml/2006/main" xmlns:r="http://schemas.openxmlformats.org/officeDocument/2006/relationships" xmlns:p="http://schemas.openxmlformats.org/presentationml/2006/main">
+  <p:cSld>
+    <p:spTree>
+      <p:nvGrpSpPr>
+        <p:cNvPr id="1" name=""/>
+        <p:cNvGrpSpPr/>
+        <p:nvPr/>
+      </p:nvGrpSpPr>
+      <p:grpSpPr>
+        <a:xfrm>
+          <a:off x="0" y="0"/>
+          <a:ext cx="0" cy="0"/>
+          <a:chOff x="0" y="0"/>
+          <a:chExt cx="0" cy="0"/>
+        </a:xfrm>
+      </p:grpSpPr>
+      <p:sp>
+        <p:nvSpPr>
+          <p:cNvPr id="2" name="Slide Image Placeholder 1"/>
+          <p:cNvSpPr>
+            <a:spLocks noGrp="1" noRot="1" noChangeAspect="1"/>
+          </p:cNvSpPr>
+          <p:nvPr>
+            <p:ph type="sldImg"/>
+          </p:nvPr>
+        </p:nvSpPr>
+        <p:spPr/>
+      </p:sp>
+      <p:sp>
+        <p:nvSpPr>
+          <p:cNvPr id="3" name="Notes Placeholder 2"/>
+          <p:cNvSpPr>
+            <a:spLocks noGrp="1"/>
+          </p:cNvSpPr>
+          <p:nvPr>
+            <p:ph type="body" idx="1"/>
+          </p:nvPr>
+        </p:nvSpPr>
+        <p:spPr/>
+        <p:txBody>
+          <a:bodyPr/>
+          <a:lstStyle/>
+          <a:p>
+            <a:endParaRPr lang="en-US" dirty="0"/>
+          </a:p>
+        </p:txBody>
+      </p:sp>
+      <p:sp>
+        <p:nvSpPr>
+          <p:cNvPr id="4" name="Slide Number Placeholder 3"/>
+          <p:cNvSpPr>
+            <a:spLocks noGrp="1"/>
+          </p:cNvSpPr>
+          <p:nvPr>
+            <p:ph type="sldNum" sz="quarter" idx="5"/>
+          </p:nvPr>
+        </p:nvSpPr>
+        <p:spPr/>
+        <p:txBody>
+          <a:bodyPr/>
+          <a:lstStyle/>
+          <a:p>
+            <a:fld id="{F524FF18-1B6C-C34C-8C0C-3F086FEA081C}" type="slidenum">
+              <a:rPr lang="en-US" smtClean="0"/>
+              <a:t>3</a:t>
+            </a:fld>
+            <a:endParaRPr lang="en-US"/>
+          </a:p>
+        </p:txBody>
+      </p:sp>
+    </p:spTree>
+    <p:extLst>
+      <p:ext uri="{BB962C8B-B14F-4D97-AF65-F5344CB8AC3E}">
+        <p14:creationId xmlns:p14="http://schemas.microsoft.com/office/powerpoint/2010/main" val="266919724"/>
+      </p:ext>
+    </p:extLst>
+  </p:cSld>
+  <p:clrMapOvr>
+    <a:masterClrMapping/>
+  </p:clrMapOvr>
+</p:notes>
+</file>
+
 <file path=ppt/slideLayouts/slideLayout1.xml><?xml version="1.0" encoding="utf-8"?>
 <p:sldLayout xmlns:a="http://schemas.openxmlformats.org/drawingml/2006/main" xmlns:r="http://schemas.openxmlformats.org/officeDocument/2006/relationships" xmlns:p="http://schemas.openxmlformats.org/presentationml/2006/main" type="title" preserve="1">
   <p:cSld name="Title Slide">
@@ -780,7 +865,7 @@
           <a:p>
             <a:fld id="{2867E21F-2328-CC4B-802A-C520CA2AB107}" type="datetimeFigureOut">
               <a:rPr lang="en-US" smtClean="0"/>
-              <a:t>1/19/22</a:t>
+              <a:t>1/31/22</a:t>
             </a:fld>
             <a:endParaRPr lang="en-US"/>
           </a:p>
@@ -978,7 +1063,7 @@
           <a:p>
             <a:fld id="{2867E21F-2328-CC4B-802A-C520CA2AB107}" type="datetimeFigureOut">
               <a:rPr lang="en-US" smtClean="0"/>
-              <a:t>1/19/22</a:t>
+              <a:t>1/31/22</a:t>
             </a:fld>
             <a:endParaRPr lang="en-US"/>
           </a:p>
@@ -1186,7 +1271,7 @@
           <a:p>
             <a:fld id="{2867E21F-2328-CC4B-802A-C520CA2AB107}" type="datetimeFigureOut">
               <a:rPr lang="en-US" smtClean="0"/>
-              <a:t>1/19/22</a:t>
+              <a:t>1/31/22</a:t>
             </a:fld>
             <a:endParaRPr lang="en-US"/>
           </a:p>
@@ -1384,7 +1469,7 @@
           <a:p>
             <a:fld id="{2867E21F-2328-CC4B-802A-C520CA2AB107}" type="datetimeFigureOut">
               <a:rPr lang="en-US" smtClean="0"/>
-              <a:t>1/19/22</a:t>
+              <a:t>1/31/22</a:t>
             </a:fld>
             <a:endParaRPr lang="en-US"/>
           </a:p>
@@ -1659,7 +1744,7 @@
           <a:p>
             <a:fld id="{2867E21F-2328-CC4B-802A-C520CA2AB107}" type="datetimeFigureOut">
               <a:rPr lang="en-US" smtClean="0"/>
-              <a:t>1/19/22</a:t>
+              <a:t>1/31/22</a:t>
             </a:fld>
             <a:endParaRPr lang="en-US"/>
           </a:p>
@@ -1924,7 +2009,7 @@
           <a:p>
             <a:fld id="{2867E21F-2328-CC4B-802A-C520CA2AB107}" type="datetimeFigureOut">
               <a:rPr lang="en-US" smtClean="0"/>
-              <a:t>1/19/22</a:t>
+              <a:t>1/31/22</a:t>
             </a:fld>
             <a:endParaRPr lang="en-US"/>
           </a:p>
@@ -2336,7 +2421,7 @@
           <a:p>
             <a:fld id="{2867E21F-2328-CC4B-802A-C520CA2AB107}" type="datetimeFigureOut">
               <a:rPr lang="en-US" smtClean="0"/>
-              <a:t>1/19/22</a:t>
+              <a:t>1/31/22</a:t>
             </a:fld>
             <a:endParaRPr lang="en-US"/>
           </a:p>
@@ -2477,7 +2562,7 @@
           <a:p>
             <a:fld id="{2867E21F-2328-CC4B-802A-C520CA2AB107}" type="datetimeFigureOut">
               <a:rPr lang="en-US" smtClean="0"/>
-              <a:t>1/19/22</a:t>
+              <a:t>1/31/22</a:t>
             </a:fld>
             <a:endParaRPr lang="en-US"/>
           </a:p>
@@ -2590,7 +2675,7 @@
           <a:p>
             <a:fld id="{2867E21F-2328-CC4B-802A-C520CA2AB107}" type="datetimeFigureOut">
               <a:rPr lang="en-US" smtClean="0"/>
-              <a:t>1/19/22</a:t>
+              <a:t>1/31/22</a:t>
             </a:fld>
             <a:endParaRPr lang="en-US"/>
           </a:p>
@@ -2901,7 +2986,7 @@
           <a:p>
             <a:fld id="{2867E21F-2328-CC4B-802A-C520CA2AB107}" type="datetimeFigureOut">
               <a:rPr lang="en-US" smtClean="0"/>
-              <a:t>1/19/22</a:t>
+              <a:t>1/31/22</a:t>
             </a:fld>
             <a:endParaRPr lang="en-US"/>
           </a:p>
@@ -3189,7 +3274,7 @@
           <a:p>
             <a:fld id="{2867E21F-2328-CC4B-802A-C520CA2AB107}" type="datetimeFigureOut">
               <a:rPr lang="en-US" smtClean="0"/>
-              <a:t>1/19/22</a:t>
+              <a:t>1/31/22</a:t>
             </a:fld>
             <a:endParaRPr lang="en-US"/>
           </a:p>
@@ -3430,7 +3515,7 @@
           <a:p>
             <a:fld id="{2867E21F-2328-CC4B-802A-C520CA2AB107}" type="datetimeFigureOut">
               <a:rPr lang="en-US" smtClean="0"/>
-              <a:t>1/19/22</a:t>
+              <a:t>1/31/22</a:t>
             </a:fld>
             <a:endParaRPr lang="en-US"/>
           </a:p>
@@ -3863,14 +3948,13 @@
         </p:nvPicPr>
         <p:blipFill>
           <a:blip r:embed="rId3"/>
-          <a:stretch>
-            <a:fillRect/>
-          </a:stretch>
+          <a:srcRect/>
+          <a:stretch/>
         </p:blipFill>
         <p:spPr>
           <a:xfrm>
-            <a:off x="299144" y="267095"/>
-            <a:ext cx="3755852" cy="2317897"/>
+            <a:off x="1148009" y="367180"/>
+            <a:ext cx="3156943" cy="2102901"/>
           </a:xfrm>
           <a:prstGeom prst="rect">
             <a:avLst/>
@@ -3893,14 +3977,13 @@
         </p:nvPicPr>
         <p:blipFill>
           <a:blip r:embed="rId4"/>
-          <a:stretch>
-            <a:fillRect/>
-          </a:stretch>
+          <a:srcRect/>
+          <a:stretch/>
         </p:blipFill>
         <p:spPr>
           <a:xfrm>
-            <a:off x="299144" y="2344477"/>
-            <a:ext cx="4087661" cy="2806997"/>
+            <a:off x="1115700" y="2284058"/>
+            <a:ext cx="3157665" cy="2103381"/>
           </a:xfrm>
           <a:prstGeom prst="rect">
             <a:avLst/>
@@ -3928,8 +4011,8 @@
         </p:blipFill>
         <p:spPr>
           <a:xfrm>
-            <a:off x="232934" y="4399389"/>
-            <a:ext cx="3755851" cy="2317897"/>
+            <a:off x="1147286" y="4271959"/>
+            <a:ext cx="3157665" cy="2103381"/>
           </a:xfrm>
           <a:prstGeom prst="rect">
             <a:avLst/>
@@ -3958,8 +4041,8 @@
         </p:blipFill>
         <p:spPr>
           <a:xfrm>
-            <a:off x="3794485" y="360321"/>
-            <a:ext cx="4548375" cy="6497679"/>
+            <a:off x="4304952" y="512213"/>
+            <a:ext cx="3569003" cy="5978607"/>
           </a:xfrm>
           <a:prstGeom prst="rect">
             <a:avLst/>
@@ -3988,14 +4071,119 @@
         </p:blipFill>
         <p:spPr>
           <a:xfrm>
-            <a:off x="7750540" y="485499"/>
-            <a:ext cx="4208526" cy="6012180"/>
+            <a:off x="7873955" y="512213"/>
+            <a:ext cx="3714188" cy="5796999"/>
           </a:xfrm>
           <a:prstGeom prst="rect">
             <a:avLst/>
           </a:prstGeom>
         </p:spPr>
       </p:pic>
+      <p:sp>
+        <p:nvSpPr>
+          <p:cNvPr id="2" name="TextBox 1">
+            <a:extLst>
+              <a:ext uri="{FF2B5EF4-FFF2-40B4-BE49-F238E27FC236}">
+                <a16:creationId xmlns:a16="http://schemas.microsoft.com/office/drawing/2014/main" id="{FD77B69E-9AE5-4B4C-95A3-1D27026E0120}"/>
+              </a:ext>
+            </a:extLst>
+          </p:cNvPr>
+          <p:cNvSpPr txBox="1"/>
+          <p:nvPr/>
+        </p:nvSpPr>
+        <p:spPr>
+          <a:xfrm>
+            <a:off x="878541" y="391857"/>
+            <a:ext cx="1708927" cy="240711"/>
+          </a:xfrm>
+          <a:prstGeom prst="rect">
+            <a:avLst/>
+          </a:prstGeom>
+          <a:noFill/>
+        </p:spPr>
+        <p:txBody>
+          <a:bodyPr wrap="square" rtlCol="0">
+            <a:spAutoFit/>
+          </a:bodyPr>
+          <a:lstStyle/>
+          <a:p>
+            <a:r>
+              <a:rPr lang="en-US" sz="1050" dirty="0"/>
+              <a:t>Sampling Time 1</a:t>
+            </a:r>
+          </a:p>
+        </p:txBody>
+      </p:sp>
+      <p:sp>
+        <p:nvSpPr>
+          <p:cNvPr id="8" name="TextBox 7">
+            <a:extLst>
+              <a:ext uri="{FF2B5EF4-FFF2-40B4-BE49-F238E27FC236}">
+                <a16:creationId xmlns:a16="http://schemas.microsoft.com/office/drawing/2014/main" id="{B3BAB4E7-CA88-2240-A0FE-D93D6E7AA06A}"/>
+              </a:ext>
+            </a:extLst>
+          </p:cNvPr>
+          <p:cNvSpPr txBox="1"/>
+          <p:nvPr/>
+        </p:nvSpPr>
+        <p:spPr>
+          <a:xfrm>
+            <a:off x="878541" y="4204468"/>
+            <a:ext cx="1708927" cy="240711"/>
+          </a:xfrm>
+          <a:prstGeom prst="rect">
+            <a:avLst/>
+          </a:prstGeom>
+          <a:noFill/>
+        </p:spPr>
+        <p:txBody>
+          <a:bodyPr wrap="square" rtlCol="0">
+            <a:spAutoFit/>
+          </a:bodyPr>
+          <a:lstStyle/>
+          <a:p>
+            <a:r>
+              <a:rPr lang="en-US" sz="1050" dirty="0"/>
+              <a:t>Sampling Time 3</a:t>
+            </a:r>
+          </a:p>
+        </p:txBody>
+      </p:sp>
+      <p:sp>
+        <p:nvSpPr>
+          <p:cNvPr id="9" name="TextBox 8">
+            <a:extLst>
+              <a:ext uri="{FF2B5EF4-FFF2-40B4-BE49-F238E27FC236}">
+                <a16:creationId xmlns:a16="http://schemas.microsoft.com/office/drawing/2014/main" id="{33F807CD-CD29-5A44-9EED-0C654327116A}"/>
+              </a:ext>
+            </a:extLst>
+          </p:cNvPr>
+          <p:cNvSpPr txBox="1"/>
+          <p:nvPr/>
+        </p:nvSpPr>
+        <p:spPr>
+          <a:xfrm>
+            <a:off x="878541" y="2192643"/>
+            <a:ext cx="1708927" cy="240711"/>
+          </a:xfrm>
+          <a:prstGeom prst="rect">
+            <a:avLst/>
+          </a:prstGeom>
+          <a:noFill/>
+        </p:spPr>
+        <p:txBody>
+          <a:bodyPr wrap="square" rtlCol="0">
+            <a:spAutoFit/>
+          </a:bodyPr>
+          <a:lstStyle/>
+          <a:p>
+            <a:r>
+              <a:rPr lang="en-US" sz="1050" dirty="0"/>
+              <a:t>Sampling Time 2</a:t>
+            </a:r>
+          </a:p>
+        </p:txBody>
+      </p:sp>
     </p:spTree>
     <p:extLst>
       <p:ext uri="{BB962C8B-B14F-4D97-AF65-F5344CB8AC3E}">
@@ -4026,155 +4214,483 @@
           <a:chExt cx="0" cy="0"/>
         </a:xfrm>
       </p:grpSpPr>
-      <p:pic>
-        <p:nvPicPr>
-          <p:cNvPr id="17" name="Picture 16">
-            <a:extLst>
-              <a:ext uri="{FF2B5EF4-FFF2-40B4-BE49-F238E27FC236}">
-                <a16:creationId xmlns:a16="http://schemas.microsoft.com/office/drawing/2014/main" id="{1E810532-2750-8D40-BDE4-A886B1D70C84}"/>
-              </a:ext>
-            </a:extLst>
-          </p:cNvPr>
-          <p:cNvPicPr>
-            <a:picLocks noChangeAspect="1"/>
-          </p:cNvPicPr>
+      <p:grpSp>
+        <p:nvGrpSpPr>
+          <p:cNvPr id="10" name="Group 9">
+            <a:extLst>
+              <a:ext uri="{FF2B5EF4-FFF2-40B4-BE49-F238E27FC236}">
+                <a16:creationId xmlns:a16="http://schemas.microsoft.com/office/drawing/2014/main" id="{D96711F4-F509-CF42-84C9-6D94B5EF8AF3}"/>
+              </a:ext>
+            </a:extLst>
+          </p:cNvPr>
+          <p:cNvGrpSpPr/>
           <p:nvPr/>
-        </p:nvPicPr>
-        <p:blipFill>
-          <a:blip r:embed="rId3"/>
-          <a:srcRect/>
-          <a:stretch/>
-        </p:blipFill>
-        <p:spPr>
+        </p:nvGrpSpPr>
+        <p:grpSpPr>
           <a:xfrm>
-            <a:off x="299144" y="268312"/>
-            <a:ext cx="3755852" cy="2315463"/>
+            <a:off x="1299881" y="573741"/>
+            <a:ext cx="10067365" cy="5476568"/>
+            <a:chOff x="0" y="84847"/>
+            <a:chExt cx="12192000" cy="6592992"/>
           </a:xfrm>
-          <a:prstGeom prst="rect">
-            <a:avLst/>
-          </a:prstGeom>
-        </p:spPr>
-      </p:pic>
-      <p:pic>
-        <p:nvPicPr>
-          <p:cNvPr id="19" name="Picture 18">
-            <a:extLst>
-              <a:ext uri="{FF2B5EF4-FFF2-40B4-BE49-F238E27FC236}">
-                <a16:creationId xmlns:a16="http://schemas.microsoft.com/office/drawing/2014/main" id="{599C7BE1-8DA3-BC42-BEA2-74FFCF960D8C}"/>
-              </a:ext>
-            </a:extLst>
-          </p:cNvPr>
-          <p:cNvPicPr>
-            <a:picLocks noChangeAspect="1"/>
-          </p:cNvPicPr>
-          <p:nvPr/>
-        </p:nvPicPr>
-        <p:blipFill>
-          <a:blip r:embed="rId4"/>
-          <a:srcRect/>
-          <a:stretch/>
-        </p:blipFill>
-        <p:spPr>
-          <a:xfrm>
-            <a:off x="404038" y="2344476"/>
-            <a:ext cx="3342436" cy="2315463"/>
-          </a:xfrm>
-          <a:prstGeom prst="rect">
-            <a:avLst/>
-          </a:prstGeom>
-        </p:spPr>
-      </p:pic>
-      <p:pic>
-        <p:nvPicPr>
-          <p:cNvPr id="21" name="Picture 20">
-            <a:extLst>
-              <a:ext uri="{FF2B5EF4-FFF2-40B4-BE49-F238E27FC236}">
-                <a16:creationId xmlns:a16="http://schemas.microsoft.com/office/drawing/2014/main" id="{52289652-6B1C-A945-AAAB-769A87AB7098}"/>
-              </a:ext>
-            </a:extLst>
-          </p:cNvPr>
-          <p:cNvPicPr>
-            <a:picLocks noChangeAspect="1"/>
-          </p:cNvPicPr>
-          <p:nvPr/>
-        </p:nvPicPr>
-        <p:blipFill>
-          <a:blip r:embed="rId5"/>
-          <a:srcRect/>
-          <a:stretch/>
-        </p:blipFill>
-        <p:spPr>
-          <a:xfrm>
-            <a:off x="232934" y="4399389"/>
-            <a:ext cx="3755851" cy="2317896"/>
-          </a:xfrm>
-          <a:prstGeom prst="rect">
-            <a:avLst/>
-          </a:prstGeom>
-        </p:spPr>
-      </p:pic>
-      <p:pic>
-        <p:nvPicPr>
-          <p:cNvPr id="3" name="Picture 2">
-            <a:extLst>
-              <a:ext uri="{FF2B5EF4-FFF2-40B4-BE49-F238E27FC236}">
-                <a16:creationId xmlns:a16="http://schemas.microsoft.com/office/drawing/2014/main" id="{F5EE1BDD-9433-7748-AE41-42F079040760}"/>
-              </a:ext>
-            </a:extLst>
-          </p:cNvPr>
-          <p:cNvPicPr>
-            <a:picLocks noChangeAspect="1"/>
-          </p:cNvPicPr>
-          <p:nvPr/>
-        </p:nvPicPr>
-        <p:blipFill>
-          <a:blip r:embed="rId6"/>
-          <a:srcRect/>
-          <a:stretch/>
-        </p:blipFill>
-        <p:spPr>
-          <a:xfrm>
-            <a:off x="3794485" y="360321"/>
-            <a:ext cx="4548375" cy="6497678"/>
-          </a:xfrm>
-          <a:prstGeom prst="rect">
-            <a:avLst/>
-          </a:prstGeom>
-        </p:spPr>
-      </p:pic>
-      <p:pic>
-        <p:nvPicPr>
-          <p:cNvPr id="4" name="Picture 3">
-            <a:extLst>
-              <a:ext uri="{FF2B5EF4-FFF2-40B4-BE49-F238E27FC236}">
-                <a16:creationId xmlns:a16="http://schemas.microsoft.com/office/drawing/2014/main" id="{6F6A4B4F-3554-DA4C-A470-786B82B2A826}"/>
-              </a:ext>
-            </a:extLst>
-          </p:cNvPr>
-          <p:cNvPicPr>
-            <a:picLocks noChangeAspect="1"/>
-          </p:cNvPicPr>
-          <p:nvPr/>
-        </p:nvPicPr>
-        <p:blipFill>
-          <a:blip r:embed="rId7"/>
-          <a:srcRect/>
-          <a:stretch/>
-        </p:blipFill>
-        <p:spPr>
-          <a:xfrm>
-            <a:off x="7750540" y="485499"/>
-            <a:ext cx="4208526" cy="6012180"/>
-          </a:xfrm>
-          <a:prstGeom prst="rect">
-            <a:avLst/>
-          </a:prstGeom>
-        </p:spPr>
-      </p:pic>
+        </p:grpSpPr>
+        <p:pic>
+          <p:nvPicPr>
+            <p:cNvPr id="3" name="Picture 2">
+              <a:extLst>
+                <a:ext uri="{FF2B5EF4-FFF2-40B4-BE49-F238E27FC236}">
+                  <a16:creationId xmlns:a16="http://schemas.microsoft.com/office/drawing/2014/main" id="{F5EE1BDD-9433-7748-AE41-42F079040760}"/>
+                </a:ext>
+              </a:extLst>
+            </p:cNvPr>
+            <p:cNvPicPr>
+              <a:picLocks noChangeAspect="1"/>
+            </p:cNvPicPr>
+            <p:nvPr/>
+          </p:nvPicPr>
+          <p:blipFill>
+            <a:blip r:embed="rId3"/>
+            <a:srcRect/>
+            <a:stretch/>
+          </p:blipFill>
+          <p:spPr>
+            <a:xfrm>
+              <a:off x="3898415" y="180161"/>
+              <a:ext cx="4085059" cy="6497678"/>
+            </a:xfrm>
+            <a:prstGeom prst="rect">
+              <a:avLst/>
+            </a:prstGeom>
+          </p:spPr>
+        </p:pic>
+        <p:pic>
+          <p:nvPicPr>
+            <p:cNvPr id="4" name="Picture 3">
+              <a:extLst>
+                <a:ext uri="{FF2B5EF4-FFF2-40B4-BE49-F238E27FC236}">
+                  <a16:creationId xmlns:a16="http://schemas.microsoft.com/office/drawing/2014/main" id="{6F6A4B4F-3554-DA4C-A470-786B82B2A826}"/>
+                </a:ext>
+              </a:extLst>
+            </p:cNvPr>
+            <p:cNvPicPr>
+              <a:picLocks noChangeAspect="1"/>
+            </p:cNvPicPr>
+            <p:nvPr/>
+          </p:nvPicPr>
+          <p:blipFill>
+            <a:blip r:embed="rId4"/>
+            <a:srcRect/>
+            <a:stretch/>
+          </p:blipFill>
+          <p:spPr>
+            <a:xfrm>
+              <a:off x="7983474" y="308692"/>
+              <a:ext cx="4208526" cy="6240616"/>
+            </a:xfrm>
+            <a:prstGeom prst="rect">
+              <a:avLst/>
+            </a:prstGeom>
+          </p:spPr>
+        </p:pic>
+        <p:pic>
+          <p:nvPicPr>
+            <p:cNvPr id="5" name="Picture 4">
+              <a:extLst>
+                <a:ext uri="{FF2B5EF4-FFF2-40B4-BE49-F238E27FC236}">
+                  <a16:creationId xmlns:a16="http://schemas.microsoft.com/office/drawing/2014/main" id="{776A183E-C5E4-FB41-8DC8-372891A623E2}"/>
+                </a:ext>
+              </a:extLst>
+            </p:cNvPr>
+            <p:cNvPicPr>
+              <a:picLocks noChangeAspect="1"/>
+            </p:cNvPicPr>
+            <p:nvPr/>
+          </p:nvPicPr>
+          <p:blipFill>
+            <a:blip r:embed="rId5"/>
+            <a:stretch>
+              <a:fillRect/>
+            </a:stretch>
+          </p:blipFill>
+          <p:spPr>
+            <a:xfrm>
+              <a:off x="0" y="4355213"/>
+              <a:ext cx="3617010" cy="2232212"/>
+            </a:xfrm>
+            <a:prstGeom prst="rect">
+              <a:avLst/>
+            </a:prstGeom>
+          </p:spPr>
+        </p:pic>
+        <p:pic>
+          <p:nvPicPr>
+            <p:cNvPr id="7" name="Picture 6">
+              <a:extLst>
+                <a:ext uri="{FF2B5EF4-FFF2-40B4-BE49-F238E27FC236}">
+                  <a16:creationId xmlns:a16="http://schemas.microsoft.com/office/drawing/2014/main" id="{E7607A9A-6BC1-884F-A8E4-FF874130243F}"/>
+                </a:ext>
+              </a:extLst>
+            </p:cNvPr>
+            <p:cNvPicPr>
+              <a:picLocks noChangeAspect="1"/>
+            </p:cNvPicPr>
+            <p:nvPr/>
+          </p:nvPicPr>
+          <p:blipFill>
+            <a:blip r:embed="rId6"/>
+            <a:stretch>
+              <a:fillRect/>
+            </a:stretch>
+          </p:blipFill>
+          <p:spPr>
+            <a:xfrm>
+              <a:off x="281405" y="2032588"/>
+              <a:ext cx="3617010" cy="2232212"/>
+            </a:xfrm>
+            <a:prstGeom prst="rect">
+              <a:avLst/>
+            </a:prstGeom>
+          </p:spPr>
+        </p:pic>
+        <p:pic>
+          <p:nvPicPr>
+            <p:cNvPr id="9" name="Picture 8">
+              <a:extLst>
+                <a:ext uri="{FF2B5EF4-FFF2-40B4-BE49-F238E27FC236}">
+                  <a16:creationId xmlns:a16="http://schemas.microsoft.com/office/drawing/2014/main" id="{376195F3-6ECD-A943-9A39-73A771657D03}"/>
+                </a:ext>
+              </a:extLst>
+            </p:cNvPr>
+            <p:cNvPicPr>
+              <a:picLocks noChangeAspect="1"/>
+            </p:cNvPicPr>
+            <p:nvPr/>
+          </p:nvPicPr>
+          <p:blipFill>
+            <a:blip r:embed="rId7"/>
+            <a:stretch>
+              <a:fillRect/>
+            </a:stretch>
+          </p:blipFill>
+          <p:spPr>
+            <a:xfrm>
+              <a:off x="281405" y="84847"/>
+              <a:ext cx="3617010" cy="2232212"/>
+            </a:xfrm>
+            <a:prstGeom prst="rect">
+              <a:avLst/>
+            </a:prstGeom>
+          </p:spPr>
+        </p:pic>
+      </p:grpSp>
     </p:spTree>
     <p:extLst>
       <p:ext uri="{BB962C8B-B14F-4D97-AF65-F5344CB8AC3E}">
         <p14:creationId xmlns:p14="http://schemas.microsoft.com/office/powerpoint/2010/main" val="955219692"/>
+      </p:ext>
+    </p:extLst>
+  </p:cSld>
+  <p:clrMapOvr>
+    <a:masterClrMapping/>
+  </p:clrMapOvr>
+</p:sld>
+</file>
+
+<file path=ppt/slides/slide3.xml><?xml version="1.0" encoding="utf-8"?>
+<p:sld xmlns:a="http://schemas.openxmlformats.org/drawingml/2006/main" xmlns:r="http://schemas.openxmlformats.org/officeDocument/2006/relationships" xmlns:p="http://schemas.openxmlformats.org/presentationml/2006/main">
+  <p:cSld>
+    <p:spTree>
+      <p:nvGrpSpPr>
+        <p:cNvPr id="1" name=""/>
+        <p:cNvGrpSpPr/>
+        <p:nvPr/>
+      </p:nvGrpSpPr>
+      <p:grpSpPr>
+        <a:xfrm>
+          <a:off x="0" y="0"/>
+          <a:ext cx="0" cy="0"/>
+          <a:chOff x="0" y="0"/>
+          <a:chExt cx="0" cy="0"/>
+        </a:xfrm>
+      </p:grpSpPr>
+      <p:grpSp>
+        <p:nvGrpSpPr>
+          <p:cNvPr id="24" name="Group 23">
+            <a:extLst>
+              <a:ext uri="{FF2B5EF4-FFF2-40B4-BE49-F238E27FC236}">
+                <a16:creationId xmlns:a16="http://schemas.microsoft.com/office/drawing/2014/main" id="{A9213B69-5951-154C-9FD3-7F6AC83D64C9}"/>
+              </a:ext>
+            </a:extLst>
+          </p:cNvPr>
+          <p:cNvGrpSpPr/>
+          <p:nvPr/>
+        </p:nvGrpSpPr>
+        <p:grpSpPr>
+          <a:xfrm>
+            <a:off x="1082650" y="460857"/>
+            <a:ext cx="10219334" cy="5640020"/>
+            <a:chOff x="163985" y="51243"/>
+            <a:chExt cx="11657378" cy="6408079"/>
+          </a:xfrm>
+        </p:grpSpPr>
+        <p:pic>
+          <p:nvPicPr>
+            <p:cNvPr id="3" name="Picture 2">
+              <a:extLst>
+                <a:ext uri="{FF2B5EF4-FFF2-40B4-BE49-F238E27FC236}">
+                  <a16:creationId xmlns:a16="http://schemas.microsoft.com/office/drawing/2014/main" id="{F5EE1BDD-9433-7748-AE41-42F079040760}"/>
+                </a:ext>
+              </a:extLst>
+            </p:cNvPr>
+            <p:cNvPicPr>
+              <a:picLocks noChangeAspect="1"/>
+            </p:cNvPicPr>
+            <p:nvPr/>
+          </p:nvPicPr>
+          <p:blipFill>
+            <a:blip r:embed="rId3"/>
+            <a:srcRect/>
+            <a:stretch/>
+          </p:blipFill>
+          <p:spPr>
+            <a:xfrm>
+              <a:off x="4023735" y="367341"/>
+              <a:ext cx="3840772" cy="6091981"/>
+            </a:xfrm>
+            <a:prstGeom prst="rect">
+              <a:avLst/>
+            </a:prstGeom>
+          </p:spPr>
+        </p:pic>
+        <p:pic>
+          <p:nvPicPr>
+            <p:cNvPr id="4" name="Picture 3">
+              <a:extLst>
+                <a:ext uri="{FF2B5EF4-FFF2-40B4-BE49-F238E27FC236}">
+                  <a16:creationId xmlns:a16="http://schemas.microsoft.com/office/drawing/2014/main" id="{6F6A4B4F-3554-DA4C-A470-786B82B2A826}"/>
+                </a:ext>
+              </a:extLst>
+            </p:cNvPr>
+            <p:cNvPicPr>
+              <a:picLocks noChangeAspect="1"/>
+            </p:cNvPicPr>
+            <p:nvPr/>
+          </p:nvPicPr>
+          <p:blipFill>
+            <a:blip r:embed="rId4"/>
+            <a:srcRect/>
+            <a:stretch/>
+          </p:blipFill>
+          <p:spPr>
+            <a:xfrm>
+              <a:off x="7864506" y="320508"/>
+              <a:ext cx="3956857" cy="6018308"/>
+            </a:xfrm>
+            <a:prstGeom prst="rect">
+              <a:avLst/>
+            </a:prstGeom>
+          </p:spPr>
+        </p:pic>
+        <p:pic>
+          <p:nvPicPr>
+            <p:cNvPr id="16" name="Picture 15">
+              <a:extLst>
+                <a:ext uri="{FF2B5EF4-FFF2-40B4-BE49-F238E27FC236}">
+                  <a16:creationId xmlns:a16="http://schemas.microsoft.com/office/drawing/2014/main" id="{E9FBEEA8-A362-974B-9E16-7AD682D58E23}"/>
+                </a:ext>
+              </a:extLst>
+            </p:cNvPr>
+            <p:cNvPicPr>
+              <a:picLocks noChangeAspect="1"/>
+            </p:cNvPicPr>
+            <p:nvPr/>
+          </p:nvPicPr>
+          <p:blipFill>
+            <a:blip r:embed="rId5"/>
+            <a:stretch>
+              <a:fillRect/>
+            </a:stretch>
+          </p:blipFill>
+          <p:spPr>
+            <a:xfrm>
+              <a:off x="606475" y="4398699"/>
+              <a:ext cx="3089677" cy="1651876"/>
+            </a:xfrm>
+            <a:prstGeom prst="rect">
+              <a:avLst/>
+            </a:prstGeom>
+          </p:spPr>
+        </p:pic>
+        <p:pic>
+          <p:nvPicPr>
+            <p:cNvPr id="18" name="Picture 17">
+              <a:extLst>
+                <a:ext uri="{FF2B5EF4-FFF2-40B4-BE49-F238E27FC236}">
+                  <a16:creationId xmlns:a16="http://schemas.microsoft.com/office/drawing/2014/main" id="{5F51ED97-2204-5C45-BF50-02959A323D0C}"/>
+                </a:ext>
+              </a:extLst>
+            </p:cNvPr>
+            <p:cNvPicPr>
+              <a:picLocks noChangeAspect="1"/>
+            </p:cNvPicPr>
+            <p:nvPr/>
+          </p:nvPicPr>
+          <p:blipFill>
+            <a:blip r:embed="rId6"/>
+            <a:stretch>
+              <a:fillRect/>
+            </a:stretch>
+          </p:blipFill>
+          <p:spPr>
+            <a:xfrm>
+              <a:off x="838961" y="2295659"/>
+              <a:ext cx="2857192" cy="1651876"/>
+            </a:xfrm>
+            <a:prstGeom prst="rect">
+              <a:avLst/>
+            </a:prstGeom>
+          </p:spPr>
+        </p:pic>
+        <p:pic>
+          <p:nvPicPr>
+            <p:cNvPr id="20" name="Picture 19">
+              <a:extLst>
+                <a:ext uri="{FF2B5EF4-FFF2-40B4-BE49-F238E27FC236}">
+                  <a16:creationId xmlns:a16="http://schemas.microsoft.com/office/drawing/2014/main" id="{0D33C548-F772-CE4F-BB9A-10EFE654A918}"/>
+                </a:ext>
+              </a:extLst>
+            </p:cNvPr>
+            <p:cNvPicPr>
+              <a:picLocks noChangeAspect="1"/>
+            </p:cNvPicPr>
+            <p:nvPr/>
+          </p:nvPicPr>
+          <p:blipFill>
+            <a:blip r:embed="rId7"/>
+            <a:stretch>
+              <a:fillRect/>
+            </a:stretch>
+          </p:blipFill>
+          <p:spPr>
+            <a:xfrm>
+              <a:off x="511378" y="320508"/>
+              <a:ext cx="3241319" cy="1651876"/>
+            </a:xfrm>
+            <a:prstGeom prst="rect">
+              <a:avLst/>
+            </a:prstGeom>
+          </p:spPr>
+        </p:pic>
+        <p:sp>
+          <p:nvSpPr>
+            <p:cNvPr id="21" name="TextBox 20">
+              <a:extLst>
+                <a:ext uri="{FF2B5EF4-FFF2-40B4-BE49-F238E27FC236}">
+                  <a16:creationId xmlns:a16="http://schemas.microsoft.com/office/drawing/2014/main" id="{58EA5AF0-AEBD-4E49-B152-FAFE3B705362}"/>
+                </a:ext>
+              </a:extLst>
+            </p:cNvPr>
+            <p:cNvSpPr txBox="1"/>
+            <p:nvPr/>
+          </p:nvSpPr>
+          <p:spPr>
+            <a:xfrm>
+              <a:off x="163985" y="51243"/>
+              <a:ext cx="1708927" cy="240711"/>
+            </a:xfrm>
+            <a:prstGeom prst="rect">
+              <a:avLst/>
+            </a:prstGeom>
+            <a:noFill/>
+          </p:spPr>
+          <p:txBody>
+            <a:bodyPr wrap="square" rtlCol="0">
+              <a:spAutoFit/>
+            </a:bodyPr>
+            <a:lstStyle/>
+            <a:p>
+              <a:r>
+                <a:rPr lang="en-US" sz="1050" dirty="0"/>
+                <a:t>Sampling Time 1</a:t>
+              </a:r>
+            </a:p>
+          </p:txBody>
+        </p:sp>
+        <p:sp>
+          <p:nvSpPr>
+            <p:cNvPr id="22" name="TextBox 21">
+              <a:extLst>
+                <a:ext uri="{FF2B5EF4-FFF2-40B4-BE49-F238E27FC236}">
+                  <a16:creationId xmlns:a16="http://schemas.microsoft.com/office/drawing/2014/main" id="{6C0C3743-09DB-0A49-A6A6-5A2969DBACA8}"/>
+                </a:ext>
+              </a:extLst>
+            </p:cNvPr>
+            <p:cNvSpPr txBox="1"/>
+            <p:nvPr/>
+          </p:nvSpPr>
+          <p:spPr>
+            <a:xfrm>
+              <a:off x="163985" y="3863854"/>
+              <a:ext cx="1708927" cy="240711"/>
+            </a:xfrm>
+            <a:prstGeom prst="rect">
+              <a:avLst/>
+            </a:prstGeom>
+            <a:noFill/>
+          </p:spPr>
+          <p:txBody>
+            <a:bodyPr wrap="square" rtlCol="0">
+              <a:spAutoFit/>
+            </a:bodyPr>
+            <a:lstStyle/>
+            <a:p>
+              <a:r>
+                <a:rPr lang="en-US" sz="1050" dirty="0"/>
+                <a:t>Sampling Time 3</a:t>
+              </a:r>
+            </a:p>
+          </p:txBody>
+        </p:sp>
+        <p:sp>
+          <p:nvSpPr>
+            <p:cNvPr id="23" name="TextBox 22">
+              <a:extLst>
+                <a:ext uri="{FF2B5EF4-FFF2-40B4-BE49-F238E27FC236}">
+                  <a16:creationId xmlns:a16="http://schemas.microsoft.com/office/drawing/2014/main" id="{D9D8077B-10FD-3F49-81D3-8BB6CB7B84A2}"/>
+                </a:ext>
+              </a:extLst>
+            </p:cNvPr>
+            <p:cNvSpPr txBox="1"/>
+            <p:nvPr/>
+          </p:nvSpPr>
+          <p:spPr>
+            <a:xfrm>
+              <a:off x="163985" y="1852029"/>
+              <a:ext cx="1708927" cy="240711"/>
+            </a:xfrm>
+            <a:prstGeom prst="rect">
+              <a:avLst/>
+            </a:prstGeom>
+            <a:noFill/>
+          </p:spPr>
+          <p:txBody>
+            <a:bodyPr wrap="square" rtlCol="0">
+              <a:spAutoFit/>
+            </a:bodyPr>
+            <a:lstStyle/>
+            <a:p>
+              <a:r>
+                <a:rPr lang="en-US" sz="1050" dirty="0"/>
+                <a:t>Sampling Time 2</a:t>
+              </a:r>
+            </a:p>
+          </p:txBody>
+        </p:sp>
+      </p:grpSp>
+    </p:spTree>
+    <p:extLst>
+      <p:ext uri="{BB962C8B-B14F-4D97-AF65-F5344CB8AC3E}">
+        <p14:creationId xmlns:p14="http://schemas.microsoft.com/office/powerpoint/2010/main" val="1343575137"/>
       </p:ext>
     </p:extLst>
   </p:cSld>

</xml_diff>

<commit_message>
updated supplementary tables and bacterial results.
</commit_message>
<xml_diff>
--- a/Figures/Combined Plots/Combined_FiguresPPT.pptx
+++ b/Figures/Combined Plots/Combined_FiguresPPT.pptx
@@ -5,7 +5,7 @@
     <p:sldMasterId id="2147483648" r:id="rId1"/>
   </p:sldMasterIdLst>
   <p:notesMasterIdLst>
-    <p:notesMasterId r:id="rId12"/>
+    <p:notesMasterId r:id="rId14"/>
   </p:notesMasterIdLst>
   <p:sldIdLst>
     <p:sldId id="256" r:id="rId2"/>
@@ -18,6 +18,8 @@
     <p:sldId id="264" r:id="rId9"/>
     <p:sldId id="265" r:id="rId10"/>
     <p:sldId id="266" r:id="rId11"/>
+    <p:sldId id="267" r:id="rId12"/>
+    <p:sldId id="268" r:id="rId13"/>
   </p:sldIdLst>
   <p:sldSz cx="12192000" cy="6858000"/>
   <p:notesSz cx="6858000" cy="9144000"/>
@@ -206,7 +208,7 @@
           <a:p>
             <a:fld id="{8C6DE032-36B9-CE46-8B72-AD9B7CA615F9}" type="datetimeFigureOut">
               <a:rPr lang="en-US" smtClean="0"/>
-              <a:t>4/26/22</a:t>
+              <a:t>4/27/22</a:t>
             </a:fld>
             <a:endParaRPr lang="en-US"/>
           </a:p>
@@ -956,7 +958,7 @@
           <a:p>
             <a:fld id="{2867E21F-2328-CC4B-802A-C520CA2AB107}" type="datetimeFigureOut">
               <a:rPr lang="en-US" smtClean="0"/>
-              <a:t>4/26/22</a:t>
+              <a:t>4/27/22</a:t>
             </a:fld>
             <a:endParaRPr lang="en-US"/>
           </a:p>
@@ -1154,7 +1156,7 @@
           <a:p>
             <a:fld id="{2867E21F-2328-CC4B-802A-C520CA2AB107}" type="datetimeFigureOut">
               <a:rPr lang="en-US" smtClean="0"/>
-              <a:t>4/26/22</a:t>
+              <a:t>4/27/22</a:t>
             </a:fld>
             <a:endParaRPr lang="en-US"/>
           </a:p>
@@ -1362,7 +1364,7 @@
           <a:p>
             <a:fld id="{2867E21F-2328-CC4B-802A-C520CA2AB107}" type="datetimeFigureOut">
               <a:rPr lang="en-US" smtClean="0"/>
-              <a:t>4/26/22</a:t>
+              <a:t>4/27/22</a:t>
             </a:fld>
             <a:endParaRPr lang="en-US"/>
           </a:p>
@@ -1560,7 +1562,7 @@
           <a:p>
             <a:fld id="{2867E21F-2328-CC4B-802A-C520CA2AB107}" type="datetimeFigureOut">
               <a:rPr lang="en-US" smtClean="0"/>
-              <a:t>4/26/22</a:t>
+              <a:t>4/27/22</a:t>
             </a:fld>
             <a:endParaRPr lang="en-US"/>
           </a:p>
@@ -1835,7 +1837,7 @@
           <a:p>
             <a:fld id="{2867E21F-2328-CC4B-802A-C520CA2AB107}" type="datetimeFigureOut">
               <a:rPr lang="en-US" smtClean="0"/>
-              <a:t>4/26/22</a:t>
+              <a:t>4/27/22</a:t>
             </a:fld>
             <a:endParaRPr lang="en-US"/>
           </a:p>
@@ -2100,7 +2102,7 @@
           <a:p>
             <a:fld id="{2867E21F-2328-CC4B-802A-C520CA2AB107}" type="datetimeFigureOut">
               <a:rPr lang="en-US" smtClean="0"/>
-              <a:t>4/26/22</a:t>
+              <a:t>4/27/22</a:t>
             </a:fld>
             <a:endParaRPr lang="en-US"/>
           </a:p>
@@ -2512,7 +2514,7 @@
           <a:p>
             <a:fld id="{2867E21F-2328-CC4B-802A-C520CA2AB107}" type="datetimeFigureOut">
               <a:rPr lang="en-US" smtClean="0"/>
-              <a:t>4/26/22</a:t>
+              <a:t>4/27/22</a:t>
             </a:fld>
             <a:endParaRPr lang="en-US"/>
           </a:p>
@@ -2653,7 +2655,7 @@
           <a:p>
             <a:fld id="{2867E21F-2328-CC4B-802A-C520CA2AB107}" type="datetimeFigureOut">
               <a:rPr lang="en-US" smtClean="0"/>
-              <a:t>4/26/22</a:t>
+              <a:t>4/27/22</a:t>
             </a:fld>
             <a:endParaRPr lang="en-US"/>
           </a:p>
@@ -2766,7 +2768,7 @@
           <a:p>
             <a:fld id="{2867E21F-2328-CC4B-802A-C520CA2AB107}" type="datetimeFigureOut">
               <a:rPr lang="en-US" smtClean="0"/>
-              <a:t>4/26/22</a:t>
+              <a:t>4/27/22</a:t>
             </a:fld>
             <a:endParaRPr lang="en-US"/>
           </a:p>
@@ -3077,7 +3079,7 @@
           <a:p>
             <a:fld id="{2867E21F-2328-CC4B-802A-C520CA2AB107}" type="datetimeFigureOut">
               <a:rPr lang="en-US" smtClean="0"/>
-              <a:t>4/26/22</a:t>
+              <a:t>4/27/22</a:t>
             </a:fld>
             <a:endParaRPr lang="en-US"/>
           </a:p>
@@ -3365,7 +3367,7 @@
           <a:p>
             <a:fld id="{2867E21F-2328-CC4B-802A-C520CA2AB107}" type="datetimeFigureOut">
               <a:rPr lang="en-US" smtClean="0"/>
-              <a:t>4/26/22</a:t>
+              <a:t>4/27/22</a:t>
             </a:fld>
             <a:endParaRPr lang="en-US"/>
           </a:p>
@@ -3606,7 +3608,7 @@
           <a:p>
             <a:fld id="{2867E21F-2328-CC4B-802A-C520CA2AB107}" type="datetimeFigureOut">
               <a:rPr lang="en-US" smtClean="0"/>
-              <a:t>4/26/22</a:t>
+              <a:t>4/27/22</a:t>
             </a:fld>
             <a:endParaRPr lang="en-US"/>
           </a:p>
@@ -4337,6 +4339,909 @@
     <p:extLst>
       <p:ext uri="{BB962C8B-B14F-4D97-AF65-F5344CB8AC3E}">
         <p14:creationId xmlns:p14="http://schemas.microsoft.com/office/powerpoint/2010/main" val="3189317146"/>
+      </p:ext>
+    </p:extLst>
+  </p:cSld>
+  <p:clrMapOvr>
+    <a:masterClrMapping/>
+  </p:clrMapOvr>
+</p:sld>
+</file>
+
+<file path=ppt/slides/slide11.xml><?xml version="1.0" encoding="utf-8"?>
+<p:sld xmlns:a="http://schemas.openxmlformats.org/drawingml/2006/main" xmlns:r="http://schemas.openxmlformats.org/officeDocument/2006/relationships" xmlns:p="http://schemas.openxmlformats.org/presentationml/2006/main">
+  <p:cSld>
+    <p:spTree>
+      <p:nvGrpSpPr>
+        <p:cNvPr id="1" name=""/>
+        <p:cNvGrpSpPr/>
+        <p:nvPr/>
+      </p:nvGrpSpPr>
+      <p:grpSpPr>
+        <a:xfrm>
+          <a:off x="0" y="0"/>
+          <a:ext cx="0" cy="0"/>
+          <a:chOff x="0" y="0"/>
+          <a:chExt cx="0" cy="0"/>
+        </a:xfrm>
+      </p:grpSpPr>
+      <p:pic>
+        <p:nvPicPr>
+          <p:cNvPr id="15" name="Picture 14">
+            <a:extLst>
+              <a:ext uri="{FF2B5EF4-FFF2-40B4-BE49-F238E27FC236}">
+                <a16:creationId xmlns:a16="http://schemas.microsoft.com/office/drawing/2014/main" id="{65CC721D-7EAD-EE45-BD57-D17A22AE5F24}"/>
+              </a:ext>
+            </a:extLst>
+          </p:cNvPr>
+          <p:cNvPicPr>
+            <a:picLocks noChangeAspect="1"/>
+          </p:cNvPicPr>
+          <p:nvPr/>
+        </p:nvPicPr>
+        <p:blipFill>
+          <a:blip r:embed="rId2"/>
+          <a:stretch>
+            <a:fillRect/>
+          </a:stretch>
+        </p:blipFill>
+        <p:spPr>
+          <a:xfrm>
+            <a:off x="5155523" y="228600"/>
+            <a:ext cx="6400800" cy="6400800"/>
+          </a:xfrm>
+          <a:prstGeom prst="rect">
+            <a:avLst/>
+          </a:prstGeom>
+        </p:spPr>
+      </p:pic>
+      <p:pic>
+        <p:nvPicPr>
+          <p:cNvPr id="19" name="Content Placeholder 18">
+            <a:extLst>
+              <a:ext uri="{FF2B5EF4-FFF2-40B4-BE49-F238E27FC236}">
+                <a16:creationId xmlns:a16="http://schemas.microsoft.com/office/drawing/2014/main" id="{6AE2F999-68C1-DB48-B100-A75AD9AF0CD5}"/>
+              </a:ext>
+            </a:extLst>
+          </p:cNvPr>
+          <p:cNvPicPr>
+            <a:picLocks noGrp="1" noChangeAspect="1"/>
+          </p:cNvPicPr>
+          <p:nvPr>
+            <p:ph idx="1"/>
+          </p:nvPr>
+        </p:nvPicPr>
+        <p:blipFill>
+          <a:blip r:embed="rId3"/>
+          <a:stretch>
+            <a:fillRect/>
+          </a:stretch>
+        </p:blipFill>
+        <p:spPr>
+          <a:xfrm>
+            <a:off x="3157212" y="151647"/>
+            <a:ext cx="4588293" cy="6554706"/>
+          </a:xfrm>
+        </p:spPr>
+      </p:pic>
+      <p:grpSp>
+        <p:nvGrpSpPr>
+          <p:cNvPr id="26" name="Group 25">
+            <a:extLst>
+              <a:ext uri="{FF2B5EF4-FFF2-40B4-BE49-F238E27FC236}">
+                <a16:creationId xmlns:a16="http://schemas.microsoft.com/office/drawing/2014/main" id="{0FAFEDB8-909E-0846-8F90-9D0677B9E247}"/>
+              </a:ext>
+            </a:extLst>
+          </p:cNvPr>
+          <p:cNvGrpSpPr/>
+          <p:nvPr/>
+        </p:nvGrpSpPr>
+        <p:grpSpPr>
+          <a:xfrm>
+            <a:off x="3705036" y="544001"/>
+            <a:ext cx="1354223" cy="276999"/>
+            <a:chOff x="3416173" y="-1691199"/>
+            <a:chExt cx="1354223" cy="276999"/>
+          </a:xfrm>
+        </p:grpSpPr>
+        <p:sp>
+          <p:nvSpPr>
+            <p:cNvPr id="23" name="TextBox 22">
+              <a:extLst>
+                <a:ext uri="{FF2B5EF4-FFF2-40B4-BE49-F238E27FC236}">
+                  <a16:creationId xmlns:a16="http://schemas.microsoft.com/office/drawing/2014/main" id="{5CD30847-3F94-924F-A9B2-1672E0F3B06A}"/>
+                </a:ext>
+              </a:extLst>
+            </p:cNvPr>
+            <p:cNvSpPr txBox="1"/>
+            <p:nvPr/>
+          </p:nvSpPr>
+          <p:spPr>
+            <a:xfrm>
+              <a:off x="3416173" y="-1691199"/>
+              <a:ext cx="201706" cy="276999"/>
+            </a:xfrm>
+            <a:prstGeom prst="rect">
+              <a:avLst/>
+            </a:prstGeom>
+            <a:noFill/>
+          </p:spPr>
+          <p:txBody>
+            <a:bodyPr wrap="square" rtlCol="0">
+              <a:spAutoFit/>
+            </a:bodyPr>
+            <a:lstStyle/>
+            <a:p>
+              <a:r>
+                <a:rPr lang="en-US" sz="1200" dirty="0"/>
+                <a:t>a</a:t>
+              </a:r>
+            </a:p>
+          </p:txBody>
+        </p:sp>
+        <p:sp>
+          <p:nvSpPr>
+            <p:cNvPr id="24" name="TextBox 23">
+              <a:extLst>
+                <a:ext uri="{FF2B5EF4-FFF2-40B4-BE49-F238E27FC236}">
+                  <a16:creationId xmlns:a16="http://schemas.microsoft.com/office/drawing/2014/main" id="{54685F74-07ED-9D4A-BEEC-98751C95654C}"/>
+                </a:ext>
+              </a:extLst>
+            </p:cNvPr>
+            <p:cNvSpPr txBox="1"/>
+            <p:nvPr/>
+          </p:nvSpPr>
+          <p:spPr>
+            <a:xfrm>
+              <a:off x="3801299" y="-1691199"/>
+              <a:ext cx="201706" cy="276999"/>
+            </a:xfrm>
+            <a:prstGeom prst="rect">
+              <a:avLst/>
+            </a:prstGeom>
+            <a:noFill/>
+          </p:spPr>
+          <p:txBody>
+            <a:bodyPr wrap="square" rtlCol="0">
+              <a:spAutoFit/>
+            </a:bodyPr>
+            <a:lstStyle/>
+            <a:p>
+              <a:r>
+                <a:rPr lang="en-US" sz="1200" dirty="0"/>
+                <a:t>b</a:t>
+              </a:r>
+            </a:p>
+          </p:txBody>
+        </p:sp>
+        <p:sp>
+          <p:nvSpPr>
+            <p:cNvPr id="25" name="TextBox 24">
+              <a:extLst>
+                <a:ext uri="{FF2B5EF4-FFF2-40B4-BE49-F238E27FC236}">
+                  <a16:creationId xmlns:a16="http://schemas.microsoft.com/office/drawing/2014/main" id="{A6E0BDD3-F8D6-834E-92C8-2B78CBEDE12C}"/>
+                </a:ext>
+              </a:extLst>
+            </p:cNvPr>
+            <p:cNvSpPr txBox="1"/>
+            <p:nvPr/>
+          </p:nvSpPr>
+          <p:spPr>
+            <a:xfrm>
+              <a:off x="4151225" y="-1691199"/>
+              <a:ext cx="619171" cy="276999"/>
+            </a:xfrm>
+            <a:prstGeom prst="rect">
+              <a:avLst/>
+            </a:prstGeom>
+            <a:noFill/>
+          </p:spPr>
+          <p:txBody>
+            <a:bodyPr wrap="square" rtlCol="0">
+              <a:spAutoFit/>
+            </a:bodyPr>
+            <a:lstStyle/>
+            <a:p>
+              <a:r>
+                <a:rPr lang="en-US" sz="1200" dirty="0"/>
+                <a:t>ab</a:t>
+              </a:r>
+            </a:p>
+          </p:txBody>
+        </p:sp>
+      </p:grpSp>
+      <p:grpSp>
+        <p:nvGrpSpPr>
+          <p:cNvPr id="28" name="Group 27">
+            <a:extLst>
+              <a:ext uri="{FF2B5EF4-FFF2-40B4-BE49-F238E27FC236}">
+                <a16:creationId xmlns:a16="http://schemas.microsoft.com/office/drawing/2014/main" id="{CA9F1848-32CE-AA4D-B7F5-1A5944EA827D}"/>
+              </a:ext>
+            </a:extLst>
+          </p:cNvPr>
+          <p:cNvGrpSpPr/>
+          <p:nvPr/>
+        </p:nvGrpSpPr>
+        <p:grpSpPr>
+          <a:xfrm>
+            <a:off x="5207479" y="544000"/>
+            <a:ext cx="1354223" cy="276999"/>
+            <a:chOff x="3416173" y="-1691199"/>
+            <a:chExt cx="1354223" cy="276999"/>
+          </a:xfrm>
+        </p:grpSpPr>
+        <p:sp>
+          <p:nvSpPr>
+            <p:cNvPr id="29" name="TextBox 28">
+              <a:extLst>
+                <a:ext uri="{FF2B5EF4-FFF2-40B4-BE49-F238E27FC236}">
+                  <a16:creationId xmlns:a16="http://schemas.microsoft.com/office/drawing/2014/main" id="{7E486560-1BF3-D148-B5E3-CD4453E73318}"/>
+                </a:ext>
+              </a:extLst>
+            </p:cNvPr>
+            <p:cNvSpPr txBox="1"/>
+            <p:nvPr/>
+          </p:nvSpPr>
+          <p:spPr>
+            <a:xfrm>
+              <a:off x="3416173" y="-1691199"/>
+              <a:ext cx="201706" cy="276999"/>
+            </a:xfrm>
+            <a:prstGeom prst="rect">
+              <a:avLst/>
+            </a:prstGeom>
+            <a:noFill/>
+          </p:spPr>
+          <p:txBody>
+            <a:bodyPr wrap="square" rtlCol="0">
+              <a:spAutoFit/>
+            </a:bodyPr>
+            <a:lstStyle/>
+            <a:p>
+              <a:r>
+                <a:rPr lang="en-US" sz="1200" dirty="0"/>
+                <a:t>a</a:t>
+              </a:r>
+            </a:p>
+          </p:txBody>
+        </p:sp>
+        <p:sp>
+          <p:nvSpPr>
+            <p:cNvPr id="30" name="TextBox 29">
+              <a:extLst>
+                <a:ext uri="{FF2B5EF4-FFF2-40B4-BE49-F238E27FC236}">
+                  <a16:creationId xmlns:a16="http://schemas.microsoft.com/office/drawing/2014/main" id="{ECFE8998-E623-D34F-978C-0B026954BE96}"/>
+                </a:ext>
+              </a:extLst>
+            </p:cNvPr>
+            <p:cNvSpPr txBox="1"/>
+            <p:nvPr/>
+          </p:nvSpPr>
+          <p:spPr>
+            <a:xfrm>
+              <a:off x="3801299" y="-1691199"/>
+              <a:ext cx="201706" cy="276999"/>
+            </a:xfrm>
+            <a:prstGeom prst="rect">
+              <a:avLst/>
+            </a:prstGeom>
+            <a:noFill/>
+          </p:spPr>
+          <p:txBody>
+            <a:bodyPr wrap="square" rtlCol="0">
+              <a:spAutoFit/>
+            </a:bodyPr>
+            <a:lstStyle/>
+            <a:p>
+              <a:r>
+                <a:rPr lang="en-US" sz="1200" dirty="0"/>
+                <a:t>b</a:t>
+              </a:r>
+            </a:p>
+          </p:txBody>
+        </p:sp>
+        <p:sp>
+          <p:nvSpPr>
+            <p:cNvPr id="31" name="TextBox 30">
+              <a:extLst>
+                <a:ext uri="{FF2B5EF4-FFF2-40B4-BE49-F238E27FC236}">
+                  <a16:creationId xmlns:a16="http://schemas.microsoft.com/office/drawing/2014/main" id="{B74D6D97-DF5B-8446-B1B3-A05AE8A95850}"/>
+                </a:ext>
+              </a:extLst>
+            </p:cNvPr>
+            <p:cNvSpPr txBox="1"/>
+            <p:nvPr/>
+          </p:nvSpPr>
+          <p:spPr>
+            <a:xfrm>
+              <a:off x="4151225" y="-1691199"/>
+              <a:ext cx="619171" cy="276999"/>
+            </a:xfrm>
+            <a:prstGeom prst="rect">
+              <a:avLst/>
+            </a:prstGeom>
+            <a:noFill/>
+          </p:spPr>
+          <p:txBody>
+            <a:bodyPr wrap="square" rtlCol="0">
+              <a:spAutoFit/>
+            </a:bodyPr>
+            <a:lstStyle/>
+            <a:p>
+              <a:r>
+                <a:rPr lang="en-US" sz="1200" dirty="0"/>
+                <a:t>ab</a:t>
+              </a:r>
+            </a:p>
+          </p:txBody>
+        </p:sp>
+      </p:grpSp>
+      <p:grpSp>
+        <p:nvGrpSpPr>
+          <p:cNvPr id="32" name="Group 31">
+            <a:extLst>
+              <a:ext uri="{FF2B5EF4-FFF2-40B4-BE49-F238E27FC236}">
+                <a16:creationId xmlns:a16="http://schemas.microsoft.com/office/drawing/2014/main" id="{194F8701-F121-1B4B-9549-E1DFB3C07AF3}"/>
+              </a:ext>
+            </a:extLst>
+          </p:cNvPr>
+          <p:cNvGrpSpPr/>
+          <p:nvPr/>
+        </p:nvGrpSpPr>
+        <p:grpSpPr>
+          <a:xfrm>
+            <a:off x="6636424" y="543999"/>
+            <a:ext cx="1354223" cy="276999"/>
+            <a:chOff x="3416173" y="-1691199"/>
+            <a:chExt cx="1354223" cy="276999"/>
+          </a:xfrm>
+        </p:grpSpPr>
+        <p:sp>
+          <p:nvSpPr>
+            <p:cNvPr id="33" name="TextBox 32">
+              <a:extLst>
+                <a:ext uri="{FF2B5EF4-FFF2-40B4-BE49-F238E27FC236}">
+                  <a16:creationId xmlns:a16="http://schemas.microsoft.com/office/drawing/2014/main" id="{E94E44BD-CD8C-1047-9E6B-CD66597F8A15}"/>
+                </a:ext>
+              </a:extLst>
+            </p:cNvPr>
+            <p:cNvSpPr txBox="1"/>
+            <p:nvPr/>
+          </p:nvSpPr>
+          <p:spPr>
+            <a:xfrm>
+              <a:off x="3416173" y="-1691199"/>
+              <a:ext cx="201706" cy="276999"/>
+            </a:xfrm>
+            <a:prstGeom prst="rect">
+              <a:avLst/>
+            </a:prstGeom>
+            <a:noFill/>
+          </p:spPr>
+          <p:txBody>
+            <a:bodyPr wrap="square" rtlCol="0">
+              <a:spAutoFit/>
+            </a:bodyPr>
+            <a:lstStyle/>
+            <a:p>
+              <a:r>
+                <a:rPr lang="en-US" sz="1200" dirty="0"/>
+                <a:t>a</a:t>
+              </a:r>
+            </a:p>
+          </p:txBody>
+        </p:sp>
+        <p:sp>
+          <p:nvSpPr>
+            <p:cNvPr id="34" name="TextBox 33">
+              <a:extLst>
+                <a:ext uri="{FF2B5EF4-FFF2-40B4-BE49-F238E27FC236}">
+                  <a16:creationId xmlns:a16="http://schemas.microsoft.com/office/drawing/2014/main" id="{21FEB1EE-3F02-974D-8DF9-8A8AC758BAEA}"/>
+                </a:ext>
+              </a:extLst>
+            </p:cNvPr>
+            <p:cNvSpPr txBox="1"/>
+            <p:nvPr/>
+          </p:nvSpPr>
+          <p:spPr>
+            <a:xfrm>
+              <a:off x="3801299" y="-1691199"/>
+              <a:ext cx="201706" cy="276999"/>
+            </a:xfrm>
+            <a:prstGeom prst="rect">
+              <a:avLst/>
+            </a:prstGeom>
+            <a:noFill/>
+          </p:spPr>
+          <p:txBody>
+            <a:bodyPr wrap="square" rtlCol="0">
+              <a:spAutoFit/>
+            </a:bodyPr>
+            <a:lstStyle/>
+            <a:p>
+              <a:r>
+                <a:rPr lang="en-US" sz="1200" dirty="0"/>
+                <a:t>b</a:t>
+              </a:r>
+            </a:p>
+          </p:txBody>
+        </p:sp>
+        <p:sp>
+          <p:nvSpPr>
+            <p:cNvPr id="35" name="TextBox 34">
+              <a:extLst>
+                <a:ext uri="{FF2B5EF4-FFF2-40B4-BE49-F238E27FC236}">
+                  <a16:creationId xmlns:a16="http://schemas.microsoft.com/office/drawing/2014/main" id="{B83CA887-259A-A348-8D53-3A1F5D04029F}"/>
+                </a:ext>
+              </a:extLst>
+            </p:cNvPr>
+            <p:cNvSpPr txBox="1"/>
+            <p:nvPr/>
+          </p:nvSpPr>
+          <p:spPr>
+            <a:xfrm>
+              <a:off x="4151225" y="-1691199"/>
+              <a:ext cx="619171" cy="276999"/>
+            </a:xfrm>
+            <a:prstGeom prst="rect">
+              <a:avLst/>
+            </a:prstGeom>
+            <a:noFill/>
+          </p:spPr>
+          <p:txBody>
+            <a:bodyPr wrap="square" rtlCol="0">
+              <a:spAutoFit/>
+            </a:bodyPr>
+            <a:lstStyle/>
+            <a:p>
+              <a:r>
+                <a:rPr lang="en-US" sz="1200" dirty="0"/>
+                <a:t>ab</a:t>
+              </a:r>
+            </a:p>
+          </p:txBody>
+        </p:sp>
+      </p:grpSp>
+      <p:grpSp>
+        <p:nvGrpSpPr>
+          <p:cNvPr id="36" name="Group 35">
+            <a:extLst>
+              <a:ext uri="{FF2B5EF4-FFF2-40B4-BE49-F238E27FC236}">
+                <a16:creationId xmlns:a16="http://schemas.microsoft.com/office/drawing/2014/main" id="{4F5BBF1F-3847-8843-9992-1EB5F30F38C6}"/>
+              </a:ext>
+            </a:extLst>
+          </p:cNvPr>
+          <p:cNvGrpSpPr/>
+          <p:nvPr/>
+        </p:nvGrpSpPr>
+        <p:grpSpPr>
+          <a:xfrm>
+            <a:off x="3705036" y="2042599"/>
+            <a:ext cx="1354223" cy="276999"/>
+            <a:chOff x="3416173" y="-1691199"/>
+            <a:chExt cx="1354223" cy="276999"/>
+          </a:xfrm>
+        </p:grpSpPr>
+        <p:sp>
+          <p:nvSpPr>
+            <p:cNvPr id="37" name="TextBox 36">
+              <a:extLst>
+                <a:ext uri="{FF2B5EF4-FFF2-40B4-BE49-F238E27FC236}">
+                  <a16:creationId xmlns:a16="http://schemas.microsoft.com/office/drawing/2014/main" id="{46E7A305-8E37-0F43-9FAA-E2AFA8E939A8}"/>
+                </a:ext>
+              </a:extLst>
+            </p:cNvPr>
+            <p:cNvSpPr txBox="1"/>
+            <p:nvPr/>
+          </p:nvSpPr>
+          <p:spPr>
+            <a:xfrm>
+              <a:off x="3416173" y="-1691199"/>
+              <a:ext cx="201706" cy="276999"/>
+            </a:xfrm>
+            <a:prstGeom prst="rect">
+              <a:avLst/>
+            </a:prstGeom>
+            <a:noFill/>
+          </p:spPr>
+          <p:txBody>
+            <a:bodyPr wrap="square" rtlCol="0">
+              <a:spAutoFit/>
+            </a:bodyPr>
+            <a:lstStyle/>
+            <a:p>
+              <a:r>
+                <a:rPr lang="en-US" sz="1200" dirty="0"/>
+                <a:t>a</a:t>
+              </a:r>
+            </a:p>
+          </p:txBody>
+        </p:sp>
+        <p:sp>
+          <p:nvSpPr>
+            <p:cNvPr id="38" name="TextBox 37">
+              <a:extLst>
+                <a:ext uri="{FF2B5EF4-FFF2-40B4-BE49-F238E27FC236}">
+                  <a16:creationId xmlns:a16="http://schemas.microsoft.com/office/drawing/2014/main" id="{25E83E14-71AD-2745-A345-78D734D82914}"/>
+                </a:ext>
+              </a:extLst>
+            </p:cNvPr>
+            <p:cNvSpPr txBox="1"/>
+            <p:nvPr/>
+          </p:nvSpPr>
+          <p:spPr>
+            <a:xfrm>
+              <a:off x="3801299" y="-1691199"/>
+              <a:ext cx="201706" cy="276999"/>
+            </a:xfrm>
+            <a:prstGeom prst="rect">
+              <a:avLst/>
+            </a:prstGeom>
+            <a:noFill/>
+          </p:spPr>
+          <p:txBody>
+            <a:bodyPr wrap="square" rtlCol="0">
+              <a:spAutoFit/>
+            </a:bodyPr>
+            <a:lstStyle/>
+            <a:p>
+              <a:r>
+                <a:rPr lang="en-US" sz="1200" dirty="0"/>
+                <a:t>b</a:t>
+              </a:r>
+            </a:p>
+          </p:txBody>
+        </p:sp>
+        <p:sp>
+          <p:nvSpPr>
+            <p:cNvPr id="39" name="TextBox 38">
+              <a:extLst>
+                <a:ext uri="{FF2B5EF4-FFF2-40B4-BE49-F238E27FC236}">
+                  <a16:creationId xmlns:a16="http://schemas.microsoft.com/office/drawing/2014/main" id="{06B4D8FF-652F-AE4A-B70D-C02634B8F677}"/>
+                </a:ext>
+              </a:extLst>
+            </p:cNvPr>
+            <p:cNvSpPr txBox="1"/>
+            <p:nvPr/>
+          </p:nvSpPr>
+          <p:spPr>
+            <a:xfrm>
+              <a:off x="4151225" y="-1691199"/>
+              <a:ext cx="619171" cy="276999"/>
+            </a:xfrm>
+            <a:prstGeom prst="rect">
+              <a:avLst/>
+            </a:prstGeom>
+            <a:noFill/>
+          </p:spPr>
+          <p:txBody>
+            <a:bodyPr wrap="square" rtlCol="0">
+              <a:spAutoFit/>
+            </a:bodyPr>
+            <a:lstStyle/>
+            <a:p>
+              <a:r>
+                <a:rPr lang="en-US" sz="1200" dirty="0"/>
+                <a:t>ab</a:t>
+              </a:r>
+            </a:p>
+          </p:txBody>
+        </p:sp>
+      </p:grpSp>
+      <p:grpSp>
+        <p:nvGrpSpPr>
+          <p:cNvPr id="40" name="Group 39">
+            <a:extLst>
+              <a:ext uri="{FF2B5EF4-FFF2-40B4-BE49-F238E27FC236}">
+                <a16:creationId xmlns:a16="http://schemas.microsoft.com/office/drawing/2014/main" id="{68F25FA2-F5EB-3948-9A2C-65850053277E}"/>
+              </a:ext>
+            </a:extLst>
+          </p:cNvPr>
+          <p:cNvGrpSpPr/>
+          <p:nvPr/>
+        </p:nvGrpSpPr>
+        <p:grpSpPr>
+          <a:xfrm>
+            <a:off x="5207479" y="1904099"/>
+            <a:ext cx="1354223" cy="276999"/>
+            <a:chOff x="3416173" y="-1691199"/>
+            <a:chExt cx="1354223" cy="276999"/>
+          </a:xfrm>
+        </p:grpSpPr>
+        <p:sp>
+          <p:nvSpPr>
+            <p:cNvPr id="41" name="TextBox 40">
+              <a:extLst>
+                <a:ext uri="{FF2B5EF4-FFF2-40B4-BE49-F238E27FC236}">
+                  <a16:creationId xmlns:a16="http://schemas.microsoft.com/office/drawing/2014/main" id="{F7DFB5A1-B065-F64A-AE53-0B3E33E134DE}"/>
+                </a:ext>
+              </a:extLst>
+            </p:cNvPr>
+            <p:cNvSpPr txBox="1"/>
+            <p:nvPr/>
+          </p:nvSpPr>
+          <p:spPr>
+            <a:xfrm>
+              <a:off x="3416173" y="-1691199"/>
+              <a:ext cx="201706" cy="276999"/>
+            </a:xfrm>
+            <a:prstGeom prst="rect">
+              <a:avLst/>
+            </a:prstGeom>
+            <a:noFill/>
+          </p:spPr>
+          <p:txBody>
+            <a:bodyPr wrap="square" rtlCol="0">
+              <a:spAutoFit/>
+            </a:bodyPr>
+            <a:lstStyle/>
+            <a:p>
+              <a:r>
+                <a:rPr lang="en-US" sz="1200" dirty="0"/>
+                <a:t>a</a:t>
+              </a:r>
+            </a:p>
+          </p:txBody>
+        </p:sp>
+        <p:sp>
+          <p:nvSpPr>
+            <p:cNvPr id="42" name="TextBox 41">
+              <a:extLst>
+                <a:ext uri="{FF2B5EF4-FFF2-40B4-BE49-F238E27FC236}">
+                  <a16:creationId xmlns:a16="http://schemas.microsoft.com/office/drawing/2014/main" id="{421FD333-4D2C-D24E-9F35-117DCD7E524E}"/>
+                </a:ext>
+              </a:extLst>
+            </p:cNvPr>
+            <p:cNvSpPr txBox="1"/>
+            <p:nvPr/>
+          </p:nvSpPr>
+          <p:spPr>
+            <a:xfrm>
+              <a:off x="3801299" y="-1691199"/>
+              <a:ext cx="201706" cy="276999"/>
+            </a:xfrm>
+            <a:prstGeom prst="rect">
+              <a:avLst/>
+            </a:prstGeom>
+            <a:noFill/>
+          </p:spPr>
+          <p:txBody>
+            <a:bodyPr wrap="square" rtlCol="0">
+              <a:spAutoFit/>
+            </a:bodyPr>
+            <a:lstStyle/>
+            <a:p>
+              <a:r>
+                <a:rPr lang="en-US" sz="1200" dirty="0"/>
+                <a:t>b</a:t>
+              </a:r>
+            </a:p>
+          </p:txBody>
+        </p:sp>
+        <p:sp>
+          <p:nvSpPr>
+            <p:cNvPr id="43" name="TextBox 42">
+              <a:extLst>
+                <a:ext uri="{FF2B5EF4-FFF2-40B4-BE49-F238E27FC236}">
+                  <a16:creationId xmlns:a16="http://schemas.microsoft.com/office/drawing/2014/main" id="{5B2E16A1-0E9A-4948-B085-78EB7F009CF3}"/>
+                </a:ext>
+              </a:extLst>
+            </p:cNvPr>
+            <p:cNvSpPr txBox="1"/>
+            <p:nvPr/>
+          </p:nvSpPr>
+          <p:spPr>
+            <a:xfrm>
+              <a:off x="4151225" y="-1691199"/>
+              <a:ext cx="619171" cy="276999"/>
+            </a:xfrm>
+            <a:prstGeom prst="rect">
+              <a:avLst/>
+            </a:prstGeom>
+            <a:noFill/>
+          </p:spPr>
+          <p:txBody>
+            <a:bodyPr wrap="square" rtlCol="0">
+              <a:spAutoFit/>
+            </a:bodyPr>
+            <a:lstStyle/>
+            <a:p>
+              <a:r>
+                <a:rPr lang="en-US" sz="1200" dirty="0"/>
+                <a:t>ab</a:t>
+              </a:r>
+            </a:p>
+          </p:txBody>
+        </p:sp>
+      </p:grpSp>
+      <p:grpSp>
+        <p:nvGrpSpPr>
+          <p:cNvPr id="44" name="Group 43">
+            <a:extLst>
+              <a:ext uri="{FF2B5EF4-FFF2-40B4-BE49-F238E27FC236}">
+                <a16:creationId xmlns:a16="http://schemas.microsoft.com/office/drawing/2014/main" id="{43D9F17F-BAA3-0147-91FB-4370C9DD7FD2}"/>
+              </a:ext>
+            </a:extLst>
+          </p:cNvPr>
+          <p:cNvGrpSpPr/>
+          <p:nvPr/>
+        </p:nvGrpSpPr>
+        <p:grpSpPr>
+          <a:xfrm>
+            <a:off x="5155522" y="6175500"/>
+            <a:ext cx="1354224" cy="276999"/>
+            <a:chOff x="3416172" y="-1691199"/>
+            <a:chExt cx="1354224" cy="276999"/>
+          </a:xfrm>
+        </p:grpSpPr>
+        <p:sp>
+          <p:nvSpPr>
+            <p:cNvPr id="45" name="TextBox 44">
+              <a:extLst>
+                <a:ext uri="{FF2B5EF4-FFF2-40B4-BE49-F238E27FC236}">
+                  <a16:creationId xmlns:a16="http://schemas.microsoft.com/office/drawing/2014/main" id="{E4A3D202-2B2C-B943-A123-E0AF790EC20D}"/>
+                </a:ext>
+              </a:extLst>
+            </p:cNvPr>
+            <p:cNvSpPr txBox="1"/>
+            <p:nvPr/>
+          </p:nvSpPr>
+          <p:spPr>
+            <a:xfrm>
+              <a:off x="3416172" y="-1691199"/>
+              <a:ext cx="385125" cy="276999"/>
+            </a:xfrm>
+            <a:prstGeom prst="rect">
+              <a:avLst/>
+            </a:prstGeom>
+            <a:noFill/>
+          </p:spPr>
+          <p:txBody>
+            <a:bodyPr wrap="square" rtlCol="0">
+              <a:spAutoFit/>
+            </a:bodyPr>
+            <a:lstStyle/>
+            <a:p>
+              <a:r>
+                <a:rPr lang="en-US" sz="1200" dirty="0"/>
+                <a:t>ab</a:t>
+              </a:r>
+            </a:p>
+          </p:txBody>
+        </p:sp>
+        <p:sp>
+          <p:nvSpPr>
+            <p:cNvPr id="46" name="TextBox 45">
+              <a:extLst>
+                <a:ext uri="{FF2B5EF4-FFF2-40B4-BE49-F238E27FC236}">
+                  <a16:creationId xmlns:a16="http://schemas.microsoft.com/office/drawing/2014/main" id="{CE23EB16-DA63-2B48-8FFE-43BF102F928E}"/>
+                </a:ext>
+              </a:extLst>
+            </p:cNvPr>
+            <p:cNvSpPr txBox="1"/>
+            <p:nvPr/>
+          </p:nvSpPr>
+          <p:spPr>
+            <a:xfrm>
+              <a:off x="3801298" y="-1691199"/>
+              <a:ext cx="555351" cy="276999"/>
+            </a:xfrm>
+            <a:prstGeom prst="rect">
+              <a:avLst/>
+            </a:prstGeom>
+            <a:noFill/>
+          </p:spPr>
+          <p:txBody>
+            <a:bodyPr wrap="square" rtlCol="0">
+              <a:spAutoFit/>
+            </a:bodyPr>
+            <a:lstStyle/>
+            <a:p>
+              <a:r>
+                <a:rPr lang="en-US" sz="1200" dirty="0"/>
+                <a:t>b</a:t>
+              </a:r>
+            </a:p>
+          </p:txBody>
+        </p:sp>
+        <p:sp>
+          <p:nvSpPr>
+            <p:cNvPr id="47" name="TextBox 46">
+              <a:extLst>
+                <a:ext uri="{FF2B5EF4-FFF2-40B4-BE49-F238E27FC236}">
+                  <a16:creationId xmlns:a16="http://schemas.microsoft.com/office/drawing/2014/main" id="{ECB48057-0DBD-E848-AE58-7FA40D800FDB}"/>
+                </a:ext>
+              </a:extLst>
+            </p:cNvPr>
+            <p:cNvSpPr txBox="1"/>
+            <p:nvPr/>
+          </p:nvSpPr>
+          <p:spPr>
+            <a:xfrm>
+              <a:off x="4151225" y="-1691199"/>
+              <a:ext cx="619171" cy="276999"/>
+            </a:xfrm>
+            <a:prstGeom prst="rect">
+              <a:avLst/>
+            </a:prstGeom>
+            <a:noFill/>
+          </p:spPr>
+          <p:txBody>
+            <a:bodyPr wrap="square" rtlCol="0">
+              <a:spAutoFit/>
+            </a:bodyPr>
+            <a:lstStyle/>
+            <a:p>
+              <a:r>
+                <a:rPr lang="en-US" sz="1200" dirty="0"/>
+                <a:t>a</a:t>
+              </a:r>
+            </a:p>
+          </p:txBody>
+        </p:sp>
+      </p:grpSp>
+    </p:spTree>
+    <p:extLst>
+      <p:ext uri="{BB962C8B-B14F-4D97-AF65-F5344CB8AC3E}">
+        <p14:creationId xmlns:p14="http://schemas.microsoft.com/office/powerpoint/2010/main" val="2174016992"/>
+      </p:ext>
+    </p:extLst>
+  </p:cSld>
+  <p:clrMapOvr>
+    <a:masterClrMapping/>
+  </p:clrMapOvr>
+</p:sld>
+</file>
+
+<file path=ppt/slides/slide12.xml><?xml version="1.0" encoding="utf-8"?>
+<p:sld xmlns:a="http://schemas.openxmlformats.org/drawingml/2006/main" xmlns:r="http://schemas.openxmlformats.org/officeDocument/2006/relationships" xmlns:p="http://schemas.openxmlformats.org/presentationml/2006/main">
+  <p:cSld>
+    <p:spTree>
+      <p:nvGrpSpPr>
+        <p:cNvPr id="1" name=""/>
+        <p:cNvGrpSpPr/>
+        <p:nvPr/>
+      </p:nvGrpSpPr>
+      <p:grpSpPr>
+        <a:xfrm>
+          <a:off x="0" y="0"/>
+          <a:ext cx="0" cy="0"/>
+          <a:chOff x="0" y="0"/>
+          <a:chExt cx="0" cy="0"/>
+        </a:xfrm>
+      </p:grpSpPr>
+      <p:pic>
+        <p:nvPicPr>
+          <p:cNvPr id="5" name="Content Placeholder 4">
+            <a:extLst>
+              <a:ext uri="{FF2B5EF4-FFF2-40B4-BE49-F238E27FC236}">
+                <a16:creationId xmlns:a16="http://schemas.microsoft.com/office/drawing/2014/main" id="{D0E0F3A8-E7DD-FF44-BA1F-D36E586DB04D}"/>
+              </a:ext>
+            </a:extLst>
+          </p:cNvPr>
+          <p:cNvPicPr>
+            <a:picLocks noGrp="1" noChangeAspect="1"/>
+          </p:cNvPicPr>
+          <p:nvPr>
+            <p:ph idx="1"/>
+          </p:nvPr>
+        </p:nvPicPr>
+        <p:blipFill>
+          <a:blip r:embed="rId2"/>
+          <a:srcRect/>
+          <a:stretch/>
+        </p:blipFill>
+        <p:spPr>
+          <a:xfrm>
+            <a:off x="3816146" y="393278"/>
+            <a:ext cx="5096204" cy="5792649"/>
+          </a:xfrm>
+        </p:spPr>
+      </p:pic>
+    </p:spTree>
+    <p:extLst>
+      <p:ext uri="{BB962C8B-B14F-4D97-AF65-F5344CB8AC3E}">
+        <p14:creationId xmlns:p14="http://schemas.microsoft.com/office/powerpoint/2010/main" val="328027178"/>
       </p:ext>
     </p:extLst>
   </p:cSld>

</xml_diff>

<commit_message>
updating manuscript and figures with pairwise comparison letters.
</commit_message>
<xml_diff>
--- a/Figures/Combined Plots/Combined_FiguresPPT.pptx
+++ b/Figures/Combined Plots/Combined_FiguresPPT.pptx
@@ -208,7 +208,7 @@
           <a:p>
             <a:fld id="{8C6DE032-36B9-CE46-8B72-AD9B7CA615F9}" type="datetimeFigureOut">
               <a:rPr lang="en-US" smtClean="0"/>
-              <a:t>4/27/22</a:t>
+              <a:t>4/28/22</a:t>
             </a:fld>
             <a:endParaRPr lang="en-US"/>
           </a:p>
@@ -958,7 +958,7 @@
           <a:p>
             <a:fld id="{2867E21F-2328-CC4B-802A-C520CA2AB107}" type="datetimeFigureOut">
               <a:rPr lang="en-US" smtClean="0"/>
-              <a:t>4/27/22</a:t>
+              <a:t>4/28/22</a:t>
             </a:fld>
             <a:endParaRPr lang="en-US"/>
           </a:p>
@@ -1156,7 +1156,7 @@
           <a:p>
             <a:fld id="{2867E21F-2328-CC4B-802A-C520CA2AB107}" type="datetimeFigureOut">
               <a:rPr lang="en-US" smtClean="0"/>
-              <a:t>4/27/22</a:t>
+              <a:t>4/28/22</a:t>
             </a:fld>
             <a:endParaRPr lang="en-US"/>
           </a:p>
@@ -1364,7 +1364,7 @@
           <a:p>
             <a:fld id="{2867E21F-2328-CC4B-802A-C520CA2AB107}" type="datetimeFigureOut">
               <a:rPr lang="en-US" smtClean="0"/>
-              <a:t>4/27/22</a:t>
+              <a:t>4/28/22</a:t>
             </a:fld>
             <a:endParaRPr lang="en-US"/>
           </a:p>
@@ -1562,7 +1562,7 @@
           <a:p>
             <a:fld id="{2867E21F-2328-CC4B-802A-C520CA2AB107}" type="datetimeFigureOut">
               <a:rPr lang="en-US" smtClean="0"/>
-              <a:t>4/27/22</a:t>
+              <a:t>4/28/22</a:t>
             </a:fld>
             <a:endParaRPr lang="en-US"/>
           </a:p>
@@ -1837,7 +1837,7 @@
           <a:p>
             <a:fld id="{2867E21F-2328-CC4B-802A-C520CA2AB107}" type="datetimeFigureOut">
               <a:rPr lang="en-US" smtClean="0"/>
-              <a:t>4/27/22</a:t>
+              <a:t>4/28/22</a:t>
             </a:fld>
             <a:endParaRPr lang="en-US"/>
           </a:p>
@@ -2102,7 +2102,7 @@
           <a:p>
             <a:fld id="{2867E21F-2328-CC4B-802A-C520CA2AB107}" type="datetimeFigureOut">
               <a:rPr lang="en-US" smtClean="0"/>
-              <a:t>4/27/22</a:t>
+              <a:t>4/28/22</a:t>
             </a:fld>
             <a:endParaRPr lang="en-US"/>
           </a:p>
@@ -2514,7 +2514,7 @@
           <a:p>
             <a:fld id="{2867E21F-2328-CC4B-802A-C520CA2AB107}" type="datetimeFigureOut">
               <a:rPr lang="en-US" smtClean="0"/>
-              <a:t>4/27/22</a:t>
+              <a:t>4/28/22</a:t>
             </a:fld>
             <a:endParaRPr lang="en-US"/>
           </a:p>
@@ -2655,7 +2655,7 @@
           <a:p>
             <a:fld id="{2867E21F-2328-CC4B-802A-C520CA2AB107}" type="datetimeFigureOut">
               <a:rPr lang="en-US" smtClean="0"/>
-              <a:t>4/27/22</a:t>
+              <a:t>4/28/22</a:t>
             </a:fld>
             <a:endParaRPr lang="en-US"/>
           </a:p>
@@ -2768,7 +2768,7 @@
           <a:p>
             <a:fld id="{2867E21F-2328-CC4B-802A-C520CA2AB107}" type="datetimeFigureOut">
               <a:rPr lang="en-US" smtClean="0"/>
-              <a:t>4/27/22</a:t>
+              <a:t>4/28/22</a:t>
             </a:fld>
             <a:endParaRPr lang="en-US"/>
           </a:p>
@@ -3079,7 +3079,7 @@
           <a:p>
             <a:fld id="{2867E21F-2328-CC4B-802A-C520CA2AB107}" type="datetimeFigureOut">
               <a:rPr lang="en-US" smtClean="0"/>
-              <a:t>4/27/22</a:t>
+              <a:t>4/28/22</a:t>
             </a:fld>
             <a:endParaRPr lang="en-US"/>
           </a:p>
@@ -3367,7 +3367,7 @@
           <a:p>
             <a:fld id="{2867E21F-2328-CC4B-802A-C520CA2AB107}" type="datetimeFigureOut">
               <a:rPr lang="en-US" smtClean="0"/>
-              <a:t>4/27/22</a:t>
+              <a:t>4/28/22</a:t>
             </a:fld>
             <a:endParaRPr lang="en-US"/>
           </a:p>
@@ -3608,7 +3608,7 @@
           <a:p>
             <a:fld id="{2867E21F-2328-CC4B-802A-C520CA2AB107}" type="datetimeFigureOut">
               <a:rPr lang="en-US" smtClean="0"/>
-              <a:t>4/27/22</a:t>
+              <a:t>4/28/22</a:t>
             </a:fld>
             <a:endParaRPr lang="en-US"/>
           </a:p>
@@ -4330,8 +4330,8 @@
         </p:blipFill>
         <p:spPr>
           <a:xfrm>
-            <a:off x="1048273" y="599767"/>
-            <a:ext cx="10494798" cy="5838166"/>
+            <a:off x="1048273" y="605602"/>
+            <a:ext cx="10494798" cy="5826495"/>
           </a:xfrm>
         </p:spPr>
       </p:pic>
@@ -6123,6 +6123,846 @@
           </a:prstGeom>
         </p:spPr>
       </p:pic>
+      <p:sp>
+        <p:nvSpPr>
+          <p:cNvPr id="3" name="TextBox 2">
+            <a:extLst>
+              <a:ext uri="{FF2B5EF4-FFF2-40B4-BE49-F238E27FC236}">
+                <a16:creationId xmlns:a16="http://schemas.microsoft.com/office/drawing/2014/main" id="{0CBD2216-B4C1-5547-A9D8-4382C0CA2C60}"/>
+              </a:ext>
+            </a:extLst>
+          </p:cNvPr>
+          <p:cNvSpPr txBox="1"/>
+          <p:nvPr/>
+        </p:nvSpPr>
+        <p:spPr>
+          <a:xfrm>
+            <a:off x="8806667" y="289814"/>
+            <a:ext cx="489021" cy="369332"/>
+          </a:xfrm>
+          <a:prstGeom prst="rect">
+            <a:avLst/>
+          </a:prstGeom>
+          <a:noFill/>
+        </p:spPr>
+        <p:txBody>
+          <a:bodyPr wrap="square" rtlCol="0">
+            <a:spAutoFit/>
+          </a:bodyPr>
+          <a:lstStyle/>
+          <a:p>
+            <a:r>
+              <a:rPr lang="en-US" dirty="0"/>
+              <a:t>a *</a:t>
+            </a:r>
+          </a:p>
+        </p:txBody>
+      </p:sp>
+      <p:sp>
+        <p:nvSpPr>
+          <p:cNvPr id="13" name="TextBox 12">
+            <a:extLst>
+              <a:ext uri="{FF2B5EF4-FFF2-40B4-BE49-F238E27FC236}">
+                <a16:creationId xmlns:a16="http://schemas.microsoft.com/office/drawing/2014/main" id="{A6A83F4E-00AC-1E4C-9E8F-F1D050DBD3F3}"/>
+              </a:ext>
+            </a:extLst>
+          </p:cNvPr>
+          <p:cNvSpPr txBox="1"/>
+          <p:nvPr/>
+        </p:nvSpPr>
+        <p:spPr>
+          <a:xfrm>
+            <a:off x="9744911" y="291928"/>
+            <a:ext cx="489021" cy="369332"/>
+          </a:xfrm>
+          <a:prstGeom prst="rect">
+            <a:avLst/>
+          </a:prstGeom>
+          <a:noFill/>
+        </p:spPr>
+        <p:txBody>
+          <a:bodyPr wrap="square" rtlCol="0">
+            <a:spAutoFit/>
+          </a:bodyPr>
+          <a:lstStyle/>
+          <a:p>
+            <a:r>
+              <a:rPr lang="en-US" dirty="0"/>
+              <a:t>b *</a:t>
+            </a:r>
+          </a:p>
+        </p:txBody>
+      </p:sp>
+      <p:sp>
+        <p:nvSpPr>
+          <p:cNvPr id="15" name="TextBox 14">
+            <a:extLst>
+              <a:ext uri="{FF2B5EF4-FFF2-40B4-BE49-F238E27FC236}">
+                <a16:creationId xmlns:a16="http://schemas.microsoft.com/office/drawing/2014/main" id="{7EC368A2-B911-5D4A-A63D-394F86EB8B92}"/>
+              </a:ext>
+            </a:extLst>
+          </p:cNvPr>
+          <p:cNvSpPr txBox="1"/>
+          <p:nvPr/>
+        </p:nvSpPr>
+        <p:spPr>
+          <a:xfrm>
+            <a:off x="10554774" y="291928"/>
+            <a:ext cx="489021" cy="369332"/>
+          </a:xfrm>
+          <a:prstGeom prst="rect">
+            <a:avLst/>
+          </a:prstGeom>
+          <a:noFill/>
+        </p:spPr>
+        <p:txBody>
+          <a:bodyPr wrap="square" rtlCol="0">
+            <a:spAutoFit/>
+          </a:bodyPr>
+          <a:lstStyle/>
+          <a:p>
+            <a:r>
+              <a:rPr lang="en-US" dirty="0"/>
+              <a:t>b *</a:t>
+            </a:r>
+          </a:p>
+        </p:txBody>
+      </p:sp>
+      <p:sp>
+        <p:nvSpPr>
+          <p:cNvPr id="17" name="TextBox 16">
+            <a:extLst>
+              <a:ext uri="{FF2B5EF4-FFF2-40B4-BE49-F238E27FC236}">
+                <a16:creationId xmlns:a16="http://schemas.microsoft.com/office/drawing/2014/main" id="{9B2AE672-5BE8-2C42-9D02-138E7B526994}"/>
+              </a:ext>
+            </a:extLst>
+          </p:cNvPr>
+          <p:cNvSpPr txBox="1"/>
+          <p:nvPr/>
+        </p:nvSpPr>
+        <p:spPr>
+          <a:xfrm>
+            <a:off x="8757032" y="2447477"/>
+            <a:ext cx="580425" cy="369332"/>
+          </a:xfrm>
+          <a:prstGeom prst="rect">
+            <a:avLst/>
+          </a:prstGeom>
+          <a:noFill/>
+        </p:spPr>
+        <p:txBody>
+          <a:bodyPr wrap="square" rtlCol="0">
+            <a:spAutoFit/>
+          </a:bodyPr>
+          <a:lstStyle/>
+          <a:p>
+            <a:r>
+              <a:rPr lang="en-US" dirty="0"/>
+              <a:t>a *+</a:t>
+            </a:r>
+          </a:p>
+        </p:txBody>
+      </p:sp>
+      <p:sp>
+        <p:nvSpPr>
+          <p:cNvPr id="18" name="TextBox 17">
+            <a:extLst>
+              <a:ext uri="{FF2B5EF4-FFF2-40B4-BE49-F238E27FC236}">
+                <a16:creationId xmlns:a16="http://schemas.microsoft.com/office/drawing/2014/main" id="{D240A176-8705-ED45-95AB-384427DF5D3B}"/>
+              </a:ext>
+            </a:extLst>
+          </p:cNvPr>
+          <p:cNvSpPr txBox="1"/>
+          <p:nvPr/>
+        </p:nvSpPr>
+        <p:spPr>
+          <a:xfrm>
+            <a:off x="9694042" y="2441570"/>
+            <a:ext cx="680333" cy="369332"/>
+          </a:xfrm>
+          <a:prstGeom prst="rect">
+            <a:avLst/>
+          </a:prstGeom>
+          <a:noFill/>
+        </p:spPr>
+        <p:txBody>
+          <a:bodyPr wrap="square" rtlCol="0">
+            <a:spAutoFit/>
+          </a:bodyPr>
+          <a:lstStyle/>
+          <a:p>
+            <a:r>
+              <a:rPr lang="en-US" dirty="0"/>
+              <a:t>ab *</a:t>
+            </a:r>
+          </a:p>
+        </p:txBody>
+      </p:sp>
+      <p:sp>
+        <p:nvSpPr>
+          <p:cNvPr id="19" name="TextBox 18">
+            <a:extLst>
+              <a:ext uri="{FF2B5EF4-FFF2-40B4-BE49-F238E27FC236}">
+                <a16:creationId xmlns:a16="http://schemas.microsoft.com/office/drawing/2014/main" id="{4DF84EC9-4E94-9D49-9ADD-0A828BE8EB4C}"/>
+              </a:ext>
+            </a:extLst>
+          </p:cNvPr>
+          <p:cNvSpPr txBox="1"/>
+          <p:nvPr/>
+        </p:nvSpPr>
+        <p:spPr>
+          <a:xfrm>
+            <a:off x="10554774" y="2442627"/>
+            <a:ext cx="580425" cy="369332"/>
+          </a:xfrm>
+          <a:prstGeom prst="rect">
+            <a:avLst/>
+          </a:prstGeom>
+          <a:noFill/>
+        </p:spPr>
+        <p:txBody>
+          <a:bodyPr wrap="square" rtlCol="0">
+            <a:spAutoFit/>
+          </a:bodyPr>
+          <a:lstStyle/>
+          <a:p>
+            <a:r>
+              <a:rPr lang="en-US" dirty="0"/>
+              <a:t>b *</a:t>
+            </a:r>
+          </a:p>
+        </p:txBody>
+      </p:sp>
+      <p:sp>
+        <p:nvSpPr>
+          <p:cNvPr id="20" name="TextBox 19">
+            <a:extLst>
+              <a:ext uri="{FF2B5EF4-FFF2-40B4-BE49-F238E27FC236}">
+                <a16:creationId xmlns:a16="http://schemas.microsoft.com/office/drawing/2014/main" id="{473DD9B7-397F-AD4F-B044-78F1772223E0}"/>
+              </a:ext>
+            </a:extLst>
+          </p:cNvPr>
+          <p:cNvSpPr txBox="1"/>
+          <p:nvPr/>
+        </p:nvSpPr>
+        <p:spPr>
+          <a:xfrm>
+            <a:off x="8757032" y="4424270"/>
+            <a:ext cx="580425" cy="369332"/>
+          </a:xfrm>
+          <a:prstGeom prst="rect">
+            <a:avLst/>
+          </a:prstGeom>
+          <a:noFill/>
+        </p:spPr>
+        <p:txBody>
+          <a:bodyPr wrap="square" rtlCol="0">
+            <a:spAutoFit/>
+          </a:bodyPr>
+          <a:lstStyle/>
+          <a:p>
+            <a:r>
+              <a:rPr lang="en-US" dirty="0"/>
+              <a:t>a +</a:t>
+            </a:r>
+          </a:p>
+        </p:txBody>
+      </p:sp>
+      <p:sp>
+        <p:nvSpPr>
+          <p:cNvPr id="21" name="TextBox 20">
+            <a:extLst>
+              <a:ext uri="{FF2B5EF4-FFF2-40B4-BE49-F238E27FC236}">
+                <a16:creationId xmlns:a16="http://schemas.microsoft.com/office/drawing/2014/main" id="{3916F30F-82FA-6441-A86D-42932782879D}"/>
+              </a:ext>
+            </a:extLst>
+          </p:cNvPr>
+          <p:cNvSpPr txBox="1"/>
+          <p:nvPr/>
+        </p:nvSpPr>
+        <p:spPr>
+          <a:xfrm>
+            <a:off x="9688710" y="4424577"/>
+            <a:ext cx="680333" cy="369332"/>
+          </a:xfrm>
+          <a:prstGeom prst="rect">
+            <a:avLst/>
+          </a:prstGeom>
+          <a:noFill/>
+        </p:spPr>
+        <p:txBody>
+          <a:bodyPr wrap="square" rtlCol="0">
+            <a:spAutoFit/>
+          </a:bodyPr>
+          <a:lstStyle/>
+          <a:p>
+            <a:r>
+              <a:rPr lang="en-US" dirty="0"/>
+              <a:t>ab *</a:t>
+            </a:r>
+          </a:p>
+        </p:txBody>
+      </p:sp>
+      <p:sp>
+        <p:nvSpPr>
+          <p:cNvPr id="22" name="TextBox 21">
+            <a:extLst>
+              <a:ext uri="{FF2B5EF4-FFF2-40B4-BE49-F238E27FC236}">
+                <a16:creationId xmlns:a16="http://schemas.microsoft.com/office/drawing/2014/main" id="{249C0347-E4FE-4348-BBDF-F984954CB6F7}"/>
+              </a:ext>
+            </a:extLst>
+          </p:cNvPr>
+          <p:cNvSpPr txBox="1"/>
+          <p:nvPr/>
+        </p:nvSpPr>
+        <p:spPr>
+          <a:xfrm>
+            <a:off x="10549442" y="4425634"/>
+            <a:ext cx="580425" cy="369332"/>
+          </a:xfrm>
+          <a:prstGeom prst="rect">
+            <a:avLst/>
+          </a:prstGeom>
+          <a:noFill/>
+        </p:spPr>
+        <p:txBody>
+          <a:bodyPr wrap="square" rtlCol="0">
+            <a:spAutoFit/>
+          </a:bodyPr>
+          <a:lstStyle/>
+          <a:p>
+            <a:r>
+              <a:rPr lang="en-US" dirty="0"/>
+              <a:t>a *</a:t>
+            </a:r>
+          </a:p>
+        </p:txBody>
+      </p:sp>
+      <p:sp>
+        <p:nvSpPr>
+          <p:cNvPr id="4" name="TextBox 3">
+            <a:extLst>
+              <a:ext uri="{FF2B5EF4-FFF2-40B4-BE49-F238E27FC236}">
+                <a16:creationId xmlns:a16="http://schemas.microsoft.com/office/drawing/2014/main" id="{80385609-891F-1D4E-BE1B-E10F03E1A4E8}"/>
+              </a:ext>
+            </a:extLst>
+          </p:cNvPr>
+          <p:cNvSpPr txBox="1"/>
+          <p:nvPr/>
+        </p:nvSpPr>
+        <p:spPr>
+          <a:xfrm>
+            <a:off x="4462784" y="289814"/>
+            <a:ext cx="597569" cy="369332"/>
+          </a:xfrm>
+          <a:prstGeom prst="rect">
+            <a:avLst/>
+          </a:prstGeom>
+          <a:noFill/>
+        </p:spPr>
+        <p:txBody>
+          <a:bodyPr wrap="square" rtlCol="0">
+            <a:spAutoFit/>
+          </a:bodyPr>
+          <a:lstStyle/>
+          <a:p>
+            <a:r>
+              <a:rPr lang="en-US" dirty="0"/>
+              <a:t>a *</a:t>
+            </a:r>
+          </a:p>
+        </p:txBody>
+      </p:sp>
+      <p:sp>
+        <p:nvSpPr>
+          <p:cNvPr id="23" name="TextBox 22">
+            <a:extLst>
+              <a:ext uri="{FF2B5EF4-FFF2-40B4-BE49-F238E27FC236}">
+                <a16:creationId xmlns:a16="http://schemas.microsoft.com/office/drawing/2014/main" id="{4520CB32-B98E-0C48-87B8-C88493C553E4}"/>
+              </a:ext>
+            </a:extLst>
+          </p:cNvPr>
+          <p:cNvSpPr txBox="1"/>
+          <p:nvPr/>
+        </p:nvSpPr>
+        <p:spPr>
+          <a:xfrm>
+            <a:off x="4958033" y="299073"/>
+            <a:ext cx="597569" cy="369332"/>
+          </a:xfrm>
+          <a:prstGeom prst="rect">
+            <a:avLst/>
+          </a:prstGeom>
+          <a:noFill/>
+        </p:spPr>
+        <p:txBody>
+          <a:bodyPr wrap="square" rtlCol="0">
+            <a:spAutoFit/>
+          </a:bodyPr>
+          <a:lstStyle/>
+          <a:p>
+            <a:r>
+              <a:rPr lang="en-US" dirty="0"/>
+              <a:t>a *</a:t>
+            </a:r>
+          </a:p>
+        </p:txBody>
+      </p:sp>
+      <p:sp>
+        <p:nvSpPr>
+          <p:cNvPr id="24" name="TextBox 23">
+            <a:extLst>
+              <a:ext uri="{FF2B5EF4-FFF2-40B4-BE49-F238E27FC236}">
+                <a16:creationId xmlns:a16="http://schemas.microsoft.com/office/drawing/2014/main" id="{4AD76EDC-530C-1A49-96BE-9870062DD1E9}"/>
+              </a:ext>
+            </a:extLst>
+          </p:cNvPr>
+          <p:cNvSpPr txBox="1"/>
+          <p:nvPr/>
+        </p:nvSpPr>
+        <p:spPr>
+          <a:xfrm>
+            <a:off x="6089802" y="284451"/>
+            <a:ext cx="597569" cy="369332"/>
+          </a:xfrm>
+          <a:prstGeom prst="rect">
+            <a:avLst/>
+          </a:prstGeom>
+          <a:noFill/>
+        </p:spPr>
+        <p:txBody>
+          <a:bodyPr wrap="square" rtlCol="0">
+            <a:spAutoFit/>
+          </a:bodyPr>
+          <a:lstStyle/>
+          <a:p>
+            <a:r>
+              <a:rPr lang="en-US" dirty="0"/>
+              <a:t>a *</a:t>
+            </a:r>
+          </a:p>
+        </p:txBody>
+      </p:sp>
+      <p:sp>
+        <p:nvSpPr>
+          <p:cNvPr id="25" name="TextBox 24">
+            <a:extLst>
+              <a:ext uri="{FF2B5EF4-FFF2-40B4-BE49-F238E27FC236}">
+                <a16:creationId xmlns:a16="http://schemas.microsoft.com/office/drawing/2014/main" id="{8F0B38C3-12FE-084D-B1A0-B582105781EA}"/>
+              </a:ext>
+            </a:extLst>
+          </p:cNvPr>
+          <p:cNvSpPr txBox="1"/>
+          <p:nvPr/>
+        </p:nvSpPr>
+        <p:spPr>
+          <a:xfrm>
+            <a:off x="5524331" y="277482"/>
+            <a:ext cx="597569" cy="369332"/>
+          </a:xfrm>
+          <a:prstGeom prst="rect">
+            <a:avLst/>
+          </a:prstGeom>
+          <a:noFill/>
+        </p:spPr>
+        <p:txBody>
+          <a:bodyPr wrap="square" rtlCol="0">
+            <a:spAutoFit/>
+          </a:bodyPr>
+          <a:lstStyle/>
+          <a:p>
+            <a:r>
+              <a:rPr lang="en-US" dirty="0"/>
+              <a:t>a *</a:t>
+            </a:r>
+          </a:p>
+        </p:txBody>
+      </p:sp>
+      <p:sp>
+        <p:nvSpPr>
+          <p:cNvPr id="26" name="TextBox 25">
+            <a:extLst>
+              <a:ext uri="{FF2B5EF4-FFF2-40B4-BE49-F238E27FC236}">
+                <a16:creationId xmlns:a16="http://schemas.microsoft.com/office/drawing/2014/main" id="{B1D7A62E-025C-3E44-B5D0-99690FF50B17}"/>
+              </a:ext>
+            </a:extLst>
+          </p:cNvPr>
+          <p:cNvSpPr txBox="1"/>
+          <p:nvPr/>
+        </p:nvSpPr>
+        <p:spPr>
+          <a:xfrm>
+            <a:off x="6624002" y="280140"/>
+            <a:ext cx="597569" cy="369332"/>
+          </a:xfrm>
+          <a:prstGeom prst="rect">
+            <a:avLst/>
+          </a:prstGeom>
+          <a:noFill/>
+        </p:spPr>
+        <p:txBody>
+          <a:bodyPr wrap="square" rtlCol="0">
+            <a:spAutoFit/>
+          </a:bodyPr>
+          <a:lstStyle/>
+          <a:p>
+            <a:r>
+              <a:rPr lang="en-US" dirty="0"/>
+              <a:t>a *</a:t>
+            </a:r>
+          </a:p>
+        </p:txBody>
+      </p:sp>
+      <p:sp>
+        <p:nvSpPr>
+          <p:cNvPr id="27" name="TextBox 26">
+            <a:extLst>
+              <a:ext uri="{FF2B5EF4-FFF2-40B4-BE49-F238E27FC236}">
+                <a16:creationId xmlns:a16="http://schemas.microsoft.com/office/drawing/2014/main" id="{5DA5D021-E70D-AD45-8F81-4848640C5D67}"/>
+              </a:ext>
+            </a:extLst>
+          </p:cNvPr>
+          <p:cNvSpPr txBox="1"/>
+          <p:nvPr/>
+        </p:nvSpPr>
+        <p:spPr>
+          <a:xfrm>
+            <a:off x="4357417" y="2433730"/>
+            <a:ext cx="597569" cy="369332"/>
+          </a:xfrm>
+          <a:prstGeom prst="rect">
+            <a:avLst/>
+          </a:prstGeom>
+          <a:noFill/>
+        </p:spPr>
+        <p:txBody>
+          <a:bodyPr wrap="square" rtlCol="0">
+            <a:spAutoFit/>
+          </a:bodyPr>
+          <a:lstStyle/>
+          <a:p>
+            <a:r>
+              <a:rPr lang="en-US" dirty="0"/>
+              <a:t>a *+</a:t>
+            </a:r>
+          </a:p>
+        </p:txBody>
+      </p:sp>
+      <p:sp>
+        <p:nvSpPr>
+          <p:cNvPr id="28" name="TextBox 27">
+            <a:extLst>
+              <a:ext uri="{FF2B5EF4-FFF2-40B4-BE49-F238E27FC236}">
+                <a16:creationId xmlns:a16="http://schemas.microsoft.com/office/drawing/2014/main" id="{9A4C7FAF-6D47-6F4D-B9D2-2960C61FCB81}"/>
+              </a:ext>
+            </a:extLst>
+          </p:cNvPr>
+          <p:cNvSpPr txBox="1"/>
+          <p:nvPr/>
+        </p:nvSpPr>
+        <p:spPr>
+          <a:xfrm>
+            <a:off x="4986441" y="2424755"/>
+            <a:ext cx="597569" cy="369332"/>
+          </a:xfrm>
+          <a:prstGeom prst="rect">
+            <a:avLst/>
+          </a:prstGeom>
+          <a:noFill/>
+        </p:spPr>
+        <p:txBody>
+          <a:bodyPr wrap="square" rtlCol="0">
+            <a:spAutoFit/>
+          </a:bodyPr>
+          <a:lstStyle/>
+          <a:p>
+            <a:r>
+              <a:rPr lang="en-US" dirty="0"/>
+              <a:t>a *</a:t>
+            </a:r>
+          </a:p>
+        </p:txBody>
+      </p:sp>
+      <p:sp>
+        <p:nvSpPr>
+          <p:cNvPr id="29" name="TextBox 28">
+            <a:extLst>
+              <a:ext uri="{FF2B5EF4-FFF2-40B4-BE49-F238E27FC236}">
+                <a16:creationId xmlns:a16="http://schemas.microsoft.com/office/drawing/2014/main" id="{EB1EC238-EC32-7A41-A212-B45E8FD5A6F4}"/>
+              </a:ext>
+            </a:extLst>
+          </p:cNvPr>
+          <p:cNvSpPr txBox="1"/>
+          <p:nvPr/>
+        </p:nvSpPr>
+        <p:spPr>
+          <a:xfrm>
+            <a:off x="6212284" y="2442154"/>
+            <a:ext cx="597569" cy="369332"/>
+          </a:xfrm>
+          <a:prstGeom prst="rect">
+            <a:avLst/>
+          </a:prstGeom>
+          <a:noFill/>
+        </p:spPr>
+        <p:txBody>
+          <a:bodyPr wrap="square" rtlCol="0">
+            <a:spAutoFit/>
+          </a:bodyPr>
+          <a:lstStyle/>
+          <a:p>
+            <a:r>
+              <a:rPr lang="en-US" dirty="0"/>
+              <a:t>a *</a:t>
+            </a:r>
+          </a:p>
+        </p:txBody>
+      </p:sp>
+      <p:sp>
+        <p:nvSpPr>
+          <p:cNvPr id="30" name="TextBox 29">
+            <a:extLst>
+              <a:ext uri="{FF2B5EF4-FFF2-40B4-BE49-F238E27FC236}">
+                <a16:creationId xmlns:a16="http://schemas.microsoft.com/office/drawing/2014/main" id="{17869FDF-96F9-F54B-AE07-DE16B22EDB8E}"/>
+              </a:ext>
+            </a:extLst>
+          </p:cNvPr>
+          <p:cNvSpPr txBox="1"/>
+          <p:nvPr/>
+        </p:nvSpPr>
+        <p:spPr>
+          <a:xfrm>
+            <a:off x="5513083" y="2421040"/>
+            <a:ext cx="597569" cy="369332"/>
+          </a:xfrm>
+          <a:prstGeom prst="rect">
+            <a:avLst/>
+          </a:prstGeom>
+          <a:noFill/>
+        </p:spPr>
+        <p:txBody>
+          <a:bodyPr wrap="square" rtlCol="0">
+            <a:spAutoFit/>
+          </a:bodyPr>
+          <a:lstStyle/>
+          <a:p>
+            <a:r>
+              <a:rPr lang="en-US" dirty="0"/>
+              <a:t>a *</a:t>
+            </a:r>
+          </a:p>
+        </p:txBody>
+      </p:sp>
+      <p:sp>
+        <p:nvSpPr>
+          <p:cNvPr id="31" name="TextBox 30">
+            <a:extLst>
+              <a:ext uri="{FF2B5EF4-FFF2-40B4-BE49-F238E27FC236}">
+                <a16:creationId xmlns:a16="http://schemas.microsoft.com/office/drawing/2014/main" id="{297FD6A0-3482-8040-AB6E-984AF5D6B7C1}"/>
+              </a:ext>
+            </a:extLst>
+          </p:cNvPr>
+          <p:cNvSpPr txBox="1"/>
+          <p:nvPr/>
+        </p:nvSpPr>
+        <p:spPr>
+          <a:xfrm>
+            <a:off x="6766000" y="2442154"/>
+            <a:ext cx="597569" cy="369332"/>
+          </a:xfrm>
+          <a:prstGeom prst="rect">
+            <a:avLst/>
+          </a:prstGeom>
+          <a:noFill/>
+        </p:spPr>
+        <p:txBody>
+          <a:bodyPr wrap="square" rtlCol="0">
+            <a:spAutoFit/>
+          </a:bodyPr>
+          <a:lstStyle/>
+          <a:p>
+            <a:r>
+              <a:rPr lang="en-US" dirty="0"/>
+              <a:t>a *</a:t>
+            </a:r>
+          </a:p>
+        </p:txBody>
+      </p:sp>
+      <p:sp>
+        <p:nvSpPr>
+          <p:cNvPr id="32" name="TextBox 31">
+            <a:extLst>
+              <a:ext uri="{FF2B5EF4-FFF2-40B4-BE49-F238E27FC236}">
+                <a16:creationId xmlns:a16="http://schemas.microsoft.com/office/drawing/2014/main" id="{51D3FFE2-1B57-B140-9849-3791EE6F3028}"/>
+              </a:ext>
+            </a:extLst>
+          </p:cNvPr>
+          <p:cNvSpPr txBox="1"/>
+          <p:nvPr/>
+        </p:nvSpPr>
+        <p:spPr>
+          <a:xfrm>
+            <a:off x="4391443" y="4424270"/>
+            <a:ext cx="597569" cy="369332"/>
+          </a:xfrm>
+          <a:prstGeom prst="rect">
+            <a:avLst/>
+          </a:prstGeom>
+          <a:noFill/>
+        </p:spPr>
+        <p:txBody>
+          <a:bodyPr wrap="square" rtlCol="0">
+            <a:spAutoFit/>
+          </a:bodyPr>
+          <a:lstStyle/>
+          <a:p>
+            <a:r>
+              <a:rPr lang="en-US" dirty="0"/>
+              <a:t>ab +</a:t>
+            </a:r>
+          </a:p>
+        </p:txBody>
+      </p:sp>
+      <p:sp>
+        <p:nvSpPr>
+          <p:cNvPr id="33" name="TextBox 32">
+            <a:extLst>
+              <a:ext uri="{FF2B5EF4-FFF2-40B4-BE49-F238E27FC236}">
+                <a16:creationId xmlns:a16="http://schemas.microsoft.com/office/drawing/2014/main" id="{7086E1CF-CE37-D641-807B-56648B811BA3}"/>
+              </a:ext>
+            </a:extLst>
+          </p:cNvPr>
+          <p:cNvSpPr txBox="1"/>
+          <p:nvPr/>
+        </p:nvSpPr>
+        <p:spPr>
+          <a:xfrm>
+            <a:off x="4936609" y="4424270"/>
+            <a:ext cx="628131" cy="369332"/>
+          </a:xfrm>
+          <a:prstGeom prst="rect">
+            <a:avLst/>
+          </a:prstGeom>
+          <a:noFill/>
+        </p:spPr>
+        <p:txBody>
+          <a:bodyPr wrap="square" rtlCol="0">
+            <a:spAutoFit/>
+          </a:bodyPr>
+          <a:lstStyle/>
+          <a:p>
+            <a:r>
+              <a:rPr lang="en-US" dirty="0"/>
+              <a:t>ab *</a:t>
+            </a:r>
+          </a:p>
+        </p:txBody>
+      </p:sp>
+      <p:sp>
+        <p:nvSpPr>
+          <p:cNvPr id="34" name="TextBox 33">
+            <a:extLst>
+              <a:ext uri="{FF2B5EF4-FFF2-40B4-BE49-F238E27FC236}">
+                <a16:creationId xmlns:a16="http://schemas.microsoft.com/office/drawing/2014/main" id="{E27871DC-C473-3448-B210-10679515F23E}"/>
+              </a:ext>
+            </a:extLst>
+          </p:cNvPr>
+          <p:cNvSpPr txBox="1"/>
+          <p:nvPr/>
+        </p:nvSpPr>
+        <p:spPr>
+          <a:xfrm>
+            <a:off x="6013131" y="4424270"/>
+            <a:ext cx="628131" cy="369332"/>
+          </a:xfrm>
+          <a:prstGeom prst="rect">
+            <a:avLst/>
+          </a:prstGeom>
+          <a:noFill/>
+        </p:spPr>
+        <p:txBody>
+          <a:bodyPr wrap="square" rtlCol="0">
+            <a:spAutoFit/>
+          </a:bodyPr>
+          <a:lstStyle/>
+          <a:p>
+            <a:r>
+              <a:rPr lang="en-US" dirty="0"/>
+              <a:t>ab *</a:t>
+            </a:r>
+          </a:p>
+        </p:txBody>
+      </p:sp>
+      <p:sp>
+        <p:nvSpPr>
+          <p:cNvPr id="35" name="TextBox 34">
+            <a:extLst>
+              <a:ext uri="{FF2B5EF4-FFF2-40B4-BE49-F238E27FC236}">
+                <a16:creationId xmlns:a16="http://schemas.microsoft.com/office/drawing/2014/main" id="{E3C39D9A-DAC6-0745-B47D-6F6B5CE88809}"/>
+              </a:ext>
+            </a:extLst>
+          </p:cNvPr>
+          <p:cNvSpPr txBox="1"/>
+          <p:nvPr/>
+        </p:nvSpPr>
+        <p:spPr>
+          <a:xfrm>
+            <a:off x="5507152" y="4424270"/>
+            <a:ext cx="540319" cy="369332"/>
+          </a:xfrm>
+          <a:prstGeom prst="rect">
+            <a:avLst/>
+          </a:prstGeom>
+          <a:noFill/>
+        </p:spPr>
+        <p:txBody>
+          <a:bodyPr wrap="square" rtlCol="0">
+            <a:spAutoFit/>
+          </a:bodyPr>
+          <a:lstStyle/>
+          <a:p>
+            <a:r>
+              <a:rPr lang="en-US" dirty="0"/>
+              <a:t>a *</a:t>
+            </a:r>
+          </a:p>
+        </p:txBody>
+      </p:sp>
+      <p:sp>
+        <p:nvSpPr>
+          <p:cNvPr id="36" name="TextBox 35">
+            <a:extLst>
+              <a:ext uri="{FF2B5EF4-FFF2-40B4-BE49-F238E27FC236}">
+                <a16:creationId xmlns:a16="http://schemas.microsoft.com/office/drawing/2014/main" id="{B0D2DD81-24E1-C344-8169-6CD551F3992D}"/>
+              </a:ext>
+            </a:extLst>
+          </p:cNvPr>
+          <p:cNvSpPr txBox="1"/>
+          <p:nvPr/>
+        </p:nvSpPr>
+        <p:spPr>
+          <a:xfrm>
+            <a:off x="6661082" y="4424270"/>
+            <a:ext cx="540319" cy="369332"/>
+          </a:xfrm>
+          <a:prstGeom prst="rect">
+            <a:avLst/>
+          </a:prstGeom>
+          <a:noFill/>
+        </p:spPr>
+        <p:txBody>
+          <a:bodyPr wrap="square" rtlCol="0">
+            <a:spAutoFit/>
+          </a:bodyPr>
+          <a:lstStyle/>
+          <a:p>
+            <a:r>
+              <a:rPr lang="en-US" dirty="0"/>
+              <a:t>b *</a:t>
+            </a:r>
+          </a:p>
+        </p:txBody>
+      </p:sp>
     </p:spTree>
     <p:extLst>
       <p:ext uri="{BB962C8B-B14F-4D97-AF65-F5344CB8AC3E}">
@@ -6155,7 +6995,7 @@
       </p:grpSpPr>
       <p:pic>
         <p:nvPicPr>
-          <p:cNvPr id="5" name="Content Placeholder 4" descr="Diagram&#10;&#10;Description automatically generated">
+          <p:cNvPr id="5" name="Content Placeholder 4">
             <a:extLst>
               <a:ext uri="{FF2B5EF4-FFF2-40B4-BE49-F238E27FC236}">
                 <a16:creationId xmlns:a16="http://schemas.microsoft.com/office/drawing/2014/main" id="{F77A45EA-3FF0-C54C-9A6D-7CF353CC5DB3}"/>
@@ -6171,14 +7011,13 @@
         </p:nvPicPr>
         <p:blipFill>
           <a:blip r:embed="rId2"/>
-          <a:stretch>
-            <a:fillRect/>
-          </a:stretch>
+          <a:srcRect/>
+          <a:stretch/>
         </p:blipFill>
         <p:spPr>
           <a:xfrm>
-            <a:off x="603157" y="601123"/>
-            <a:ext cx="10019786" cy="5574621"/>
+            <a:off x="634267" y="601123"/>
+            <a:ext cx="9957565" cy="5574621"/>
           </a:xfrm>
         </p:spPr>
       </p:pic>
@@ -6434,14 +7273,13 @@
         </p:nvPicPr>
         <p:blipFill>
           <a:blip r:embed="rId6"/>
-          <a:stretch>
-            <a:fillRect/>
-          </a:stretch>
+          <a:srcRect/>
+          <a:stretch/>
         </p:blipFill>
         <p:spPr>
           <a:xfrm>
             <a:off x="7891340" y="345883"/>
-            <a:ext cx="3101009" cy="6202017"/>
+            <a:ext cx="3101008" cy="6202017"/>
           </a:xfrm>
           <a:prstGeom prst="rect">
             <a:avLst/>

</xml_diff>